<commit_message>
Add presentation takeaways slide and indistinguishability aside
</commit_message>
<xml_diff>
--- a/talk/symbolic-equivalence-project-presentation.pptx
+++ b/talk/symbolic-equivalence-project-presentation.pptx
@@ -5,7 +5,7 @@
     <p:sldMasterId id="2147483648" r:id="rId1"/>
   </p:sldMasterIdLst>
   <p:notesMasterIdLst>
-    <p:notesMasterId r:id="rId15"/>
+    <p:notesMasterId r:id="rId17"/>
   </p:notesMasterIdLst>
   <p:sldIdLst>
     <p:sldId id="256" r:id="rId2"/>
@@ -15,12 +15,14 @@
     <p:sldId id="268" r:id="rId6"/>
     <p:sldId id="273" r:id="rId7"/>
     <p:sldId id="259" r:id="rId8"/>
-    <p:sldId id="274" r:id="rId9"/>
+    <p:sldId id="277" r:id="rId9"/>
     <p:sldId id="262" r:id="rId10"/>
     <p:sldId id="272" r:id="rId11"/>
     <p:sldId id="270" r:id="rId12"/>
-    <p:sldId id="271" r:id="rId13"/>
-    <p:sldId id="264" r:id="rId14"/>
+    <p:sldId id="276" r:id="rId13"/>
+    <p:sldId id="271" r:id="rId14"/>
+    <p:sldId id="264" r:id="rId15"/>
+    <p:sldId id="275" r:id="rId16"/>
   </p:sldIdLst>
   <p:sldSz cx="12192000" cy="6858000"/>
   <p:notesSz cx="6858000" cy="9144000"/>
@@ -220,7 +222,7 @@
           <a:p>
             <a:fld id="{F7FDEF31-028F-6C4A-B91E-E815DD7C571C}" type="datetimeFigureOut">
               <a:rPr lang="en-US" smtClean="0"/>
-              <a:t>12/4/25</a:t>
+              <a:t>12/8/25</a:t>
             </a:fld>
             <a:endParaRPr lang="en-US"/>
           </a:p>
@@ -618,7 +620,10 @@
           <a:bodyPr/>
           <a:lstStyle/>
           <a:p>
-            <a:endParaRPr lang="en-US" dirty="0"/>
+            <a:r>
+              <a:rPr lang="en-US" dirty="0"/>
+              <a:t>Timestamp: 1:30</a:t>
+            </a:r>
           </a:p>
         </p:txBody>
       </p:sp>
@@ -639,7 +644,262 @@
           <a:p>
             <a:fld id="{7CB969D7-15A9-C645-9495-29D21CEFFAAA}" type="slidenum">
               <a:rPr lang="en-US" smtClean="0"/>
-              <a:t>12</a:t>
+              <a:t>4</a:t>
+            </a:fld>
+            <a:endParaRPr lang="en-US"/>
+          </a:p>
+        </p:txBody>
+      </p:sp>
+    </p:spTree>
+    <p:extLst>
+      <p:ext uri="{BB962C8B-B14F-4D97-AF65-F5344CB8AC3E}">
+        <p14:creationId xmlns:p14="http://schemas.microsoft.com/office/powerpoint/2010/main" val="107613644"/>
+      </p:ext>
+    </p:extLst>
+  </p:cSld>
+  <p:clrMapOvr>
+    <a:masterClrMapping/>
+  </p:clrMapOvr>
+</p:notes>
+</file>
+
+<file path=ppt/notesSlides/notesSlide3.xml><?xml version="1.0" encoding="utf-8"?>
+<p:notes xmlns:a="http://schemas.openxmlformats.org/drawingml/2006/main" xmlns:r="http://schemas.openxmlformats.org/officeDocument/2006/relationships" xmlns:p="http://schemas.openxmlformats.org/presentationml/2006/main">
+  <p:cSld>
+    <p:spTree>
+      <p:nvGrpSpPr>
+        <p:cNvPr id="1" name=""/>
+        <p:cNvGrpSpPr/>
+        <p:nvPr/>
+      </p:nvGrpSpPr>
+      <p:grpSpPr>
+        <a:xfrm>
+          <a:off x="0" y="0"/>
+          <a:ext cx="0" cy="0"/>
+          <a:chOff x="0" y="0"/>
+          <a:chExt cx="0" cy="0"/>
+        </a:xfrm>
+      </p:grpSpPr>
+      <p:sp>
+        <p:nvSpPr>
+          <p:cNvPr id="2" name="Slide Image Placeholder 1"/>
+          <p:cNvSpPr>
+            <a:spLocks noGrp="1" noRot="1" noChangeAspect="1"/>
+          </p:cNvSpPr>
+          <p:nvPr>
+            <p:ph type="sldImg"/>
+          </p:nvPr>
+        </p:nvSpPr>
+        <p:spPr/>
+      </p:sp>
+      <p:sp>
+        <p:nvSpPr>
+          <p:cNvPr id="3" name="Notes Placeholder 2"/>
+          <p:cNvSpPr>
+            <a:spLocks noGrp="1"/>
+          </p:cNvSpPr>
+          <p:nvPr>
+            <p:ph type="body" idx="1"/>
+          </p:nvPr>
+        </p:nvSpPr>
+        <p:spPr/>
+        <p:txBody>
+          <a:bodyPr/>
+          <a:lstStyle/>
+          <a:p>
+            <a:r>
+              <a:rPr lang="en-US" dirty="0"/>
+              <a:t>Timestamp: 6:30</a:t>
+            </a:r>
+          </a:p>
+        </p:txBody>
+      </p:sp>
+      <p:sp>
+        <p:nvSpPr>
+          <p:cNvPr id="4" name="Slide Number Placeholder 3"/>
+          <p:cNvSpPr>
+            <a:spLocks noGrp="1"/>
+          </p:cNvSpPr>
+          <p:nvPr>
+            <p:ph type="sldNum" sz="quarter" idx="5"/>
+          </p:nvPr>
+        </p:nvSpPr>
+        <p:spPr/>
+        <p:txBody>
+          <a:bodyPr/>
+          <a:lstStyle/>
+          <a:p>
+            <a:fld id="{7CB969D7-15A9-C645-9495-29D21CEFFAAA}" type="slidenum">
+              <a:rPr lang="en-US" smtClean="0"/>
+              <a:t>10</a:t>
+            </a:fld>
+            <a:endParaRPr lang="en-US"/>
+          </a:p>
+        </p:txBody>
+      </p:sp>
+    </p:spTree>
+    <p:extLst>
+      <p:ext uri="{BB962C8B-B14F-4D97-AF65-F5344CB8AC3E}">
+        <p14:creationId xmlns:p14="http://schemas.microsoft.com/office/powerpoint/2010/main" val="929622242"/>
+      </p:ext>
+    </p:extLst>
+  </p:cSld>
+  <p:clrMapOvr>
+    <a:masterClrMapping/>
+  </p:clrMapOvr>
+</p:notes>
+</file>
+
+<file path=ppt/notesSlides/notesSlide4.xml><?xml version="1.0" encoding="utf-8"?>
+<p:notes xmlns:a="http://schemas.openxmlformats.org/drawingml/2006/main" xmlns:r="http://schemas.openxmlformats.org/officeDocument/2006/relationships" xmlns:p="http://schemas.openxmlformats.org/presentationml/2006/main">
+  <p:cSld>
+    <p:spTree>
+      <p:nvGrpSpPr>
+        <p:cNvPr id="1" name=""/>
+        <p:cNvGrpSpPr/>
+        <p:nvPr/>
+      </p:nvGrpSpPr>
+      <p:grpSpPr>
+        <a:xfrm>
+          <a:off x="0" y="0"/>
+          <a:ext cx="0" cy="0"/>
+          <a:chOff x="0" y="0"/>
+          <a:chExt cx="0" cy="0"/>
+        </a:xfrm>
+      </p:grpSpPr>
+      <p:sp>
+        <p:nvSpPr>
+          <p:cNvPr id="2" name="Slide Image Placeholder 1"/>
+          <p:cNvSpPr>
+            <a:spLocks noGrp="1" noRot="1" noChangeAspect="1"/>
+          </p:cNvSpPr>
+          <p:nvPr>
+            <p:ph type="sldImg"/>
+          </p:nvPr>
+        </p:nvSpPr>
+        <p:spPr/>
+      </p:sp>
+      <p:sp>
+        <p:nvSpPr>
+          <p:cNvPr id="3" name="Notes Placeholder 2"/>
+          <p:cNvSpPr>
+            <a:spLocks noGrp="1"/>
+          </p:cNvSpPr>
+          <p:nvPr>
+            <p:ph type="body" idx="1"/>
+          </p:nvPr>
+        </p:nvSpPr>
+        <p:spPr/>
+        <p:txBody>
+          <a:bodyPr/>
+          <a:lstStyle/>
+          <a:p>
+            <a:endParaRPr lang="en-US" dirty="0"/>
+          </a:p>
+        </p:txBody>
+      </p:sp>
+      <p:sp>
+        <p:nvSpPr>
+          <p:cNvPr id="4" name="Slide Number Placeholder 3"/>
+          <p:cNvSpPr>
+            <a:spLocks noGrp="1"/>
+          </p:cNvSpPr>
+          <p:nvPr>
+            <p:ph type="sldNum" sz="quarter" idx="5"/>
+          </p:nvPr>
+        </p:nvSpPr>
+        <p:spPr/>
+        <p:txBody>
+          <a:bodyPr/>
+          <a:lstStyle/>
+          <a:p>
+            <a:fld id="{7CB969D7-15A9-C645-9495-29D21CEFFAAA}" type="slidenum">
+              <a:rPr lang="en-US" smtClean="0"/>
+              <a:t>11</a:t>
+            </a:fld>
+            <a:endParaRPr lang="en-US"/>
+          </a:p>
+        </p:txBody>
+      </p:sp>
+    </p:spTree>
+    <p:extLst>
+      <p:ext uri="{BB962C8B-B14F-4D97-AF65-F5344CB8AC3E}">
+        <p14:creationId xmlns:p14="http://schemas.microsoft.com/office/powerpoint/2010/main" val="3189331177"/>
+      </p:ext>
+    </p:extLst>
+  </p:cSld>
+  <p:clrMapOvr>
+    <a:masterClrMapping/>
+  </p:clrMapOvr>
+</p:notes>
+</file>
+
+<file path=ppt/notesSlides/notesSlide5.xml><?xml version="1.0" encoding="utf-8"?>
+<p:notes xmlns:a="http://schemas.openxmlformats.org/drawingml/2006/main" xmlns:r="http://schemas.openxmlformats.org/officeDocument/2006/relationships" xmlns:p="http://schemas.openxmlformats.org/presentationml/2006/main">
+  <p:cSld>
+    <p:spTree>
+      <p:nvGrpSpPr>
+        <p:cNvPr id="1" name=""/>
+        <p:cNvGrpSpPr/>
+        <p:nvPr/>
+      </p:nvGrpSpPr>
+      <p:grpSpPr>
+        <a:xfrm>
+          <a:off x="0" y="0"/>
+          <a:ext cx="0" cy="0"/>
+          <a:chOff x="0" y="0"/>
+          <a:chExt cx="0" cy="0"/>
+        </a:xfrm>
+      </p:grpSpPr>
+      <p:sp>
+        <p:nvSpPr>
+          <p:cNvPr id="2" name="Slide Image Placeholder 1"/>
+          <p:cNvSpPr>
+            <a:spLocks noGrp="1" noRot="1" noChangeAspect="1"/>
+          </p:cNvSpPr>
+          <p:nvPr>
+            <p:ph type="sldImg"/>
+          </p:nvPr>
+        </p:nvSpPr>
+        <p:spPr/>
+      </p:sp>
+      <p:sp>
+        <p:nvSpPr>
+          <p:cNvPr id="3" name="Notes Placeholder 2"/>
+          <p:cNvSpPr>
+            <a:spLocks noGrp="1"/>
+          </p:cNvSpPr>
+          <p:nvPr>
+            <p:ph type="body" idx="1"/>
+          </p:nvPr>
+        </p:nvSpPr>
+        <p:spPr/>
+        <p:txBody>
+          <a:bodyPr/>
+          <a:lstStyle/>
+          <a:p>
+            <a:endParaRPr lang="en-US" dirty="0"/>
+          </a:p>
+        </p:txBody>
+      </p:sp>
+      <p:sp>
+        <p:nvSpPr>
+          <p:cNvPr id="4" name="Slide Number Placeholder 3"/>
+          <p:cNvSpPr>
+            <a:spLocks noGrp="1"/>
+          </p:cNvSpPr>
+          <p:nvPr>
+            <p:ph type="sldNum" sz="quarter" idx="5"/>
+          </p:nvPr>
+        </p:nvSpPr>
+        <p:spPr/>
+        <p:txBody>
+          <a:bodyPr/>
+          <a:lstStyle/>
+          <a:p>
+            <a:fld id="{7CB969D7-15A9-C645-9495-29D21CEFFAAA}" type="slidenum">
+              <a:rPr lang="en-US" smtClean="0"/>
+              <a:t>13</a:t>
             </a:fld>
             <a:endParaRPr lang="en-US"/>
           </a:p>
@@ -649,6 +909,93 @@
     <p:extLst>
       <p:ext uri="{BB962C8B-B14F-4D97-AF65-F5344CB8AC3E}">
         <p14:creationId xmlns:p14="http://schemas.microsoft.com/office/powerpoint/2010/main" val="3683267258"/>
+      </p:ext>
+    </p:extLst>
+  </p:cSld>
+  <p:clrMapOvr>
+    <a:masterClrMapping/>
+  </p:clrMapOvr>
+</p:notes>
+</file>
+
+<file path=ppt/notesSlides/notesSlide6.xml><?xml version="1.0" encoding="utf-8"?>
+<p:notes xmlns:a="http://schemas.openxmlformats.org/drawingml/2006/main" xmlns:r="http://schemas.openxmlformats.org/officeDocument/2006/relationships" xmlns:p="http://schemas.openxmlformats.org/presentationml/2006/main">
+  <p:cSld>
+    <p:spTree>
+      <p:nvGrpSpPr>
+        <p:cNvPr id="1" name=""/>
+        <p:cNvGrpSpPr/>
+        <p:nvPr/>
+      </p:nvGrpSpPr>
+      <p:grpSpPr>
+        <a:xfrm>
+          <a:off x="0" y="0"/>
+          <a:ext cx="0" cy="0"/>
+          <a:chOff x="0" y="0"/>
+          <a:chExt cx="0" cy="0"/>
+        </a:xfrm>
+      </p:grpSpPr>
+      <p:sp>
+        <p:nvSpPr>
+          <p:cNvPr id="2" name="Slide Image Placeholder 1"/>
+          <p:cNvSpPr>
+            <a:spLocks noGrp="1" noRot="1" noChangeAspect="1"/>
+          </p:cNvSpPr>
+          <p:nvPr>
+            <p:ph type="sldImg"/>
+          </p:nvPr>
+        </p:nvSpPr>
+        <p:spPr/>
+      </p:sp>
+      <p:sp>
+        <p:nvSpPr>
+          <p:cNvPr id="3" name="Notes Placeholder 2"/>
+          <p:cNvSpPr>
+            <a:spLocks noGrp="1"/>
+          </p:cNvSpPr>
+          <p:nvPr>
+            <p:ph type="body" idx="1"/>
+          </p:nvPr>
+        </p:nvSpPr>
+        <p:spPr/>
+        <p:txBody>
+          <a:bodyPr/>
+          <a:lstStyle/>
+          <a:p>
+            <a:r>
+              <a:rPr lang="en-US" dirty="0"/>
+              <a:t>Timestamp: 10:00</a:t>
+            </a:r>
+          </a:p>
+        </p:txBody>
+      </p:sp>
+      <p:sp>
+        <p:nvSpPr>
+          <p:cNvPr id="4" name="Slide Number Placeholder 3"/>
+          <p:cNvSpPr>
+            <a:spLocks noGrp="1"/>
+          </p:cNvSpPr>
+          <p:nvPr>
+            <p:ph type="sldNum" sz="quarter" idx="5"/>
+          </p:nvPr>
+        </p:nvSpPr>
+        <p:spPr/>
+        <p:txBody>
+          <a:bodyPr/>
+          <a:lstStyle/>
+          <a:p>
+            <a:fld id="{7CB969D7-15A9-C645-9495-29D21CEFFAAA}" type="slidenum">
+              <a:rPr lang="en-US" smtClean="0"/>
+              <a:t>15</a:t>
+            </a:fld>
+            <a:endParaRPr lang="en-US"/>
+          </a:p>
+        </p:txBody>
+      </p:sp>
+    </p:spTree>
+    <p:extLst>
+      <p:ext uri="{BB962C8B-B14F-4D97-AF65-F5344CB8AC3E}">
+        <p14:creationId xmlns:p14="http://schemas.microsoft.com/office/powerpoint/2010/main" val="2220215267"/>
       </p:ext>
     </p:extLst>
   </p:cSld>
@@ -805,7 +1152,7 @@
           <a:p>
             <a:fld id="{A5F0AC94-D332-2846-B7AF-8633478E2901}" type="datetimeFigureOut">
               <a:rPr lang="en-US" smtClean="0"/>
-              <a:t>12/4/25</a:t>
+              <a:t>12/8/25</a:t>
             </a:fld>
             <a:endParaRPr lang="en-US"/>
           </a:p>
@@ -1003,7 +1350,7 @@
           <a:p>
             <a:fld id="{A5F0AC94-D332-2846-B7AF-8633478E2901}" type="datetimeFigureOut">
               <a:rPr lang="en-US" smtClean="0"/>
-              <a:t>12/4/25</a:t>
+              <a:t>12/8/25</a:t>
             </a:fld>
             <a:endParaRPr lang="en-US"/>
           </a:p>
@@ -1211,7 +1558,7 @@
           <a:p>
             <a:fld id="{A5F0AC94-D332-2846-B7AF-8633478E2901}" type="datetimeFigureOut">
               <a:rPr lang="en-US" smtClean="0"/>
-              <a:t>12/4/25</a:t>
+              <a:t>12/8/25</a:t>
             </a:fld>
             <a:endParaRPr lang="en-US"/>
           </a:p>
@@ -1409,7 +1756,7 @@
           <a:p>
             <a:fld id="{A5F0AC94-D332-2846-B7AF-8633478E2901}" type="datetimeFigureOut">
               <a:rPr lang="en-US" smtClean="0"/>
-              <a:t>12/4/25</a:t>
+              <a:t>12/8/25</a:t>
             </a:fld>
             <a:endParaRPr lang="en-US"/>
           </a:p>
@@ -1684,7 +2031,7 @@
           <a:p>
             <a:fld id="{A5F0AC94-D332-2846-B7AF-8633478E2901}" type="datetimeFigureOut">
               <a:rPr lang="en-US" smtClean="0"/>
-              <a:t>12/4/25</a:t>
+              <a:t>12/8/25</a:t>
             </a:fld>
             <a:endParaRPr lang="en-US"/>
           </a:p>
@@ -1949,7 +2296,7 @@
           <a:p>
             <a:fld id="{A5F0AC94-D332-2846-B7AF-8633478E2901}" type="datetimeFigureOut">
               <a:rPr lang="en-US" smtClean="0"/>
-              <a:t>12/4/25</a:t>
+              <a:t>12/8/25</a:t>
             </a:fld>
             <a:endParaRPr lang="en-US"/>
           </a:p>
@@ -2361,7 +2708,7 @@
           <a:p>
             <a:fld id="{A5F0AC94-D332-2846-B7AF-8633478E2901}" type="datetimeFigureOut">
               <a:rPr lang="en-US" smtClean="0"/>
-              <a:t>12/4/25</a:t>
+              <a:t>12/8/25</a:t>
             </a:fld>
             <a:endParaRPr lang="en-US"/>
           </a:p>
@@ -2502,7 +2849,7 @@
           <a:p>
             <a:fld id="{A5F0AC94-D332-2846-B7AF-8633478E2901}" type="datetimeFigureOut">
               <a:rPr lang="en-US" smtClean="0"/>
-              <a:t>12/4/25</a:t>
+              <a:t>12/8/25</a:t>
             </a:fld>
             <a:endParaRPr lang="en-US"/>
           </a:p>
@@ -2615,7 +2962,7 @@
           <a:p>
             <a:fld id="{A5F0AC94-D332-2846-B7AF-8633478E2901}" type="datetimeFigureOut">
               <a:rPr lang="en-US" smtClean="0"/>
-              <a:t>12/4/25</a:t>
+              <a:t>12/8/25</a:t>
             </a:fld>
             <a:endParaRPr lang="en-US"/>
           </a:p>
@@ -2926,7 +3273,7 @@
           <a:p>
             <a:fld id="{A5F0AC94-D332-2846-B7AF-8633478E2901}" type="datetimeFigureOut">
               <a:rPr lang="en-US" smtClean="0"/>
-              <a:t>12/4/25</a:t>
+              <a:t>12/8/25</a:t>
             </a:fld>
             <a:endParaRPr lang="en-US"/>
           </a:p>
@@ -3214,7 +3561,7 @@
           <a:p>
             <a:fld id="{A5F0AC94-D332-2846-B7AF-8633478E2901}" type="datetimeFigureOut">
               <a:rPr lang="en-US" smtClean="0"/>
-              <a:t>12/4/25</a:t>
+              <a:t>12/8/25</a:t>
             </a:fld>
             <a:endParaRPr lang="en-US"/>
           </a:p>
@@ -3455,7 +3802,7 @@
           <a:p>
             <a:fld id="{A5F0AC94-D332-2846-B7AF-8633478E2901}" type="datetimeFigureOut">
               <a:rPr lang="en-US" smtClean="0"/>
-              <a:t>12/4/25</a:t>
+              <a:t>12/8/25</a:t>
             </a:fld>
             <a:endParaRPr lang="en-US"/>
           </a:p>
@@ -4024,7 +4371,7 @@
           <p:nvPr/>
         </p:nvPicPr>
         <p:blipFill>
-          <a:blip r:embed="rId2">
+          <a:blip r:embed="rId3">
             <a:alphaModFix amt="35000"/>
           </a:blip>
           <a:stretch>
@@ -4109,8 +4456,8 @@
             <a:chExt cx="4306330" cy="809368"/>
           </a:xfrm>
         </p:grpSpPr>
-        <mc:AlternateContent xmlns:mc="http://schemas.openxmlformats.org/markup-compatibility/2006">
-          <mc:Choice xmlns:a14="http://schemas.microsoft.com/office/drawing/2010/main" Requires="a14">
+        <mc:AlternateContent xmlns:mc="http://schemas.openxmlformats.org/markup-compatibility/2006" xmlns:a14="http://schemas.microsoft.com/office/drawing/2010/main">
+          <mc:Choice Requires="a14">
             <p:sp>
               <p:nvSpPr>
                 <p:cNvPr id="6" name="TextBox 5">
@@ -4306,7 +4653,7 @@
               </p:txBody>
             </p:sp>
           </mc:Choice>
-          <mc:Fallback>
+          <mc:Fallback xmlns="">
             <p:sp>
               <p:nvSpPr>
                 <p:cNvPr id="6" name="TextBox 5">
@@ -4330,7 +4677,7 @@
                   <a:avLst/>
                 </a:prstGeom>
                 <a:blipFill>
-                  <a:blip r:embed="rId3"/>
+                  <a:blip r:embed="rId4"/>
                   <a:stretch>
                     <a:fillRect l="-1875" t="-7500" b="-35000"/>
                   </a:stretch>
@@ -4539,7 +4886,7 @@
           <a:p>
             <a:r>
               <a:rPr lang="en-US" dirty="0"/>
-              <a:t>Observational equivalence</a:t>
+              <a:t>Adversarial equivalence</a:t>
             </a:r>
           </a:p>
         </p:txBody>
@@ -4559,10 +4906,10 @@
           <p:nvPr/>
         </p:nvPicPr>
         <p:blipFill>
-          <a:blip r:embed="rId2">
+          <a:blip r:embed="rId3">
             <a:extLst>
               <a:ext uri="{96DAC541-7B7A-43D3-8B79-37D633B846F1}">
-                <asvg:svgBlip xmlns:asvg="http://schemas.microsoft.com/office/drawing/2016/SVG/main" r:embed="rId3"/>
+                <asvg:svgBlip xmlns:asvg="http://schemas.microsoft.com/office/drawing/2016/SVG/main" r:embed="rId4"/>
               </a:ext>
             </a:extLst>
           </a:blip>
@@ -4580,8 +4927,8 @@
           </a:prstGeom>
         </p:spPr>
       </p:pic>
-      <mc:AlternateContent xmlns:mc="http://schemas.openxmlformats.org/markup-compatibility/2006">
-        <mc:Choice xmlns:a14="http://schemas.microsoft.com/office/drawing/2010/main" Requires="a14">
+      <mc:AlternateContent xmlns:mc="http://schemas.openxmlformats.org/markup-compatibility/2006" xmlns:a14="http://schemas.microsoft.com/office/drawing/2010/main">
+        <mc:Choice Requires="a14">
           <p:sp>
             <p:nvSpPr>
               <p:cNvPr id="5" name="Cloud Callout 4">
@@ -4658,7 +5005,7 @@
             </p:txBody>
           </p:sp>
         </mc:Choice>
-        <mc:Fallback>
+        <mc:Fallback xmlns="">
           <p:sp>
             <p:nvSpPr>
               <p:cNvPr id="5" name="Cloud Callout 4">
@@ -4685,7 +5032,7 @@
                 </a:avLst>
               </a:prstGeom>
               <a:blipFill>
-                <a:blip r:embed="rId4"/>
+                <a:blip r:embed="rId5"/>
                 <a:stretch>
                   <a:fillRect/>
                 </a:stretch>
@@ -4711,8 +5058,8 @@
           </p:sp>
         </mc:Fallback>
       </mc:AlternateContent>
-      <mc:AlternateContent xmlns:mc="http://schemas.openxmlformats.org/markup-compatibility/2006">
-        <mc:Choice xmlns:a14="http://schemas.microsoft.com/office/drawing/2010/main" Requires="a14">
+      <mc:AlternateContent xmlns:mc="http://schemas.openxmlformats.org/markup-compatibility/2006" xmlns:a14="http://schemas.microsoft.com/office/drawing/2010/main">
+        <mc:Choice Requires="a14">
           <p:sp>
             <p:nvSpPr>
               <p:cNvPr id="7" name="TextBox 6">
@@ -4771,7 +5118,7 @@
             </p:txBody>
           </p:sp>
         </mc:Choice>
-        <mc:Fallback>
+        <mc:Fallback xmlns="">
           <p:sp>
             <p:nvSpPr>
               <p:cNvPr id="7" name="TextBox 6">
@@ -4795,7 +5142,7 @@
                 <a:avLst/>
               </a:prstGeom>
               <a:blipFill>
-                <a:blip r:embed="rId5"/>
+                <a:blip r:embed="rId6"/>
                 <a:stretch>
                   <a:fillRect l="-5556" b="-19355"/>
                 </a:stretch>
@@ -4900,10 +5247,10 @@
             <p:nvPr/>
           </p:nvPicPr>
           <p:blipFill>
-            <a:blip r:embed="rId2">
+            <a:blip r:embed="rId3">
               <a:extLst>
                 <a:ext uri="{96DAC541-7B7A-43D3-8B79-37D633B846F1}">
-                  <asvg:svgBlip xmlns:asvg="http://schemas.microsoft.com/office/drawing/2016/SVG/main" r:embed="rId3"/>
+                  <asvg:svgBlip xmlns:asvg="http://schemas.microsoft.com/office/drawing/2016/SVG/main" r:embed="rId4"/>
                 </a:ext>
               </a:extLst>
             </a:blip>
@@ -4921,8 +5268,8 @@
             </a:prstGeom>
           </p:spPr>
         </p:pic>
-        <mc:AlternateContent xmlns:mc="http://schemas.openxmlformats.org/markup-compatibility/2006">
-          <mc:Choice xmlns:a14="http://schemas.microsoft.com/office/drawing/2010/main" Requires="a14">
+        <mc:AlternateContent xmlns:mc="http://schemas.openxmlformats.org/markup-compatibility/2006" xmlns:a14="http://schemas.microsoft.com/office/drawing/2010/main">
+          <mc:Choice Requires="a14">
             <p:sp>
               <p:nvSpPr>
                 <p:cNvPr id="12" name="TextBox 11">
@@ -4951,6 +5298,7 @@
                 </a:bodyPr>
                 <a:lstStyle/>
                 <a:p>
+                  <a:pPr/>
                   <a14:m>
                     <m:oMathPara xmlns:m="http://schemas.openxmlformats.org/officeDocument/2006/math">
                       <m:oMathParaPr>
@@ -4972,7 +5320,7 @@
               </p:txBody>
             </p:sp>
           </mc:Choice>
-          <mc:Fallback>
+          <mc:Fallback xmlns="">
             <p:sp>
               <p:nvSpPr>
                 <p:cNvPr id="12" name="TextBox 11">
@@ -4996,7 +5344,7 @@
                   <a:avLst/>
                 </a:prstGeom>
                 <a:blipFill>
-                  <a:blip r:embed="rId6"/>
+                  <a:blip r:embed="rId7"/>
                   <a:stretch>
                     <a:fillRect l="-41463" r="-41463" b="-17808"/>
                   </a:stretch>
@@ -5147,10 +5495,10 @@
             <p:nvPr/>
           </p:nvPicPr>
           <p:blipFill>
-            <a:blip r:embed="rId2">
+            <a:blip r:embed="rId3">
               <a:extLst>
                 <a:ext uri="{96DAC541-7B7A-43D3-8B79-37D633B846F1}">
-                  <asvg:svgBlip xmlns:asvg="http://schemas.microsoft.com/office/drawing/2016/SVG/main" r:embed="rId3"/>
+                  <asvg:svgBlip xmlns:asvg="http://schemas.microsoft.com/office/drawing/2016/SVG/main" r:embed="rId4"/>
                 </a:ext>
               </a:extLst>
             </a:blip>
@@ -5168,8 +5516,8 @@
             </a:prstGeom>
           </p:spPr>
         </p:pic>
-        <mc:AlternateContent xmlns:mc="http://schemas.openxmlformats.org/markup-compatibility/2006">
-          <mc:Choice xmlns:a14="http://schemas.microsoft.com/office/drawing/2010/main" Requires="a14">
+        <mc:AlternateContent xmlns:mc="http://schemas.openxmlformats.org/markup-compatibility/2006" xmlns:a14="http://schemas.microsoft.com/office/drawing/2010/main">
+          <mc:Choice Requires="a14">
             <p:sp>
               <p:nvSpPr>
                 <p:cNvPr id="18" name="TextBox 17">
@@ -5198,6 +5546,7 @@
                 </a:bodyPr>
                 <a:lstStyle/>
                 <a:p>
+                  <a:pPr/>
                   <a14:m>
                     <m:oMathPara xmlns:m="http://schemas.openxmlformats.org/officeDocument/2006/math">
                       <m:oMathParaPr>
@@ -5219,7 +5568,7 @@
               </p:txBody>
             </p:sp>
           </mc:Choice>
-          <mc:Fallback>
+          <mc:Fallback xmlns="">
             <p:sp>
               <p:nvSpPr>
                 <p:cNvPr id="18" name="TextBox 17">
@@ -5243,7 +5592,7 @@
                   <a:avLst/>
                 </a:prstGeom>
                 <a:blipFill>
-                  <a:blip r:embed="rId7"/>
+                  <a:blip r:embed="rId8"/>
                   <a:stretch>
                     <a:fillRect l="-41463" r="-41463" b="-16216"/>
                   </a:stretch>
@@ -5409,7 +5758,7 @@
             <a:pPr algn="ctr"/>
             <a:r>
               <a:rPr lang="en-US" dirty="0"/>
-              <a:t>Observations X</a:t>
+              <a:t>Observations X’</a:t>
             </a:r>
           </a:p>
         </p:txBody>
@@ -5463,7 +5812,7 @@
             <a:pPr algn="ctr"/>
             <a:r>
               <a:rPr lang="en-US" dirty="0"/>
-              <a:t>Observations Y</a:t>
+              <a:t>Observations Y’</a:t>
             </a:r>
           </a:p>
         </p:txBody>
@@ -5686,6 +6035,141 @@
           </a:fontRef>
         </p:style>
       </p:cxnSp>
+      <mc:AlternateContent xmlns:mc="http://schemas.openxmlformats.org/markup-compatibility/2006">
+        <mc:Choice xmlns:a14="http://schemas.microsoft.com/office/drawing/2010/main" Requires="a14">
+          <p:sp>
+            <p:nvSpPr>
+              <p:cNvPr id="6" name="TextBox 5">
+                <a:extLst>
+                  <a:ext uri="{FF2B5EF4-FFF2-40B4-BE49-F238E27FC236}">
+                    <a16:creationId xmlns:a16="http://schemas.microsoft.com/office/drawing/2014/main" id="{3BF4F84D-3535-A401-3C92-B2D258FEFCAD}"/>
+                  </a:ext>
+                </a:extLst>
+              </p:cNvPr>
+              <p:cNvSpPr txBox="1"/>
+              <p:nvPr/>
+            </p:nvSpPr>
+            <p:spPr>
+              <a:xfrm>
+                <a:off x="5706370" y="5575457"/>
+                <a:ext cx="1051891" cy="1200329"/>
+              </a:xfrm>
+              <a:prstGeom prst="rect">
+                <a:avLst/>
+              </a:prstGeom>
+              <a:noFill/>
+            </p:spPr>
+            <p:txBody>
+              <a:bodyPr wrap="none" rtlCol="0">
+                <a:spAutoFit/>
+              </a:bodyPr>
+              <a:lstStyle/>
+              <a:p>
+                <a14:m>
+                  <m:oMathPara xmlns:m="http://schemas.openxmlformats.org/officeDocument/2006/math">
+                    <m:oMathParaPr>
+                      <m:jc m:val="centerGroup"/>
+                    </m:oMathParaPr>
+                    <m:oMath xmlns:m="http://schemas.openxmlformats.org/officeDocument/2006/math">
+                      <m:r>
+                        <a:rPr lang="en-US" sz="7200" i="1">
+                          <a:latin typeface="Cambria Math" panose="02040503050406030204" pitchFamily="18" charset="0"/>
+                          <a:ea typeface="Cambria Math" panose="02040503050406030204" pitchFamily="18" charset="0"/>
+                        </a:rPr>
+                        <m:t>≈</m:t>
+                      </m:r>
+                    </m:oMath>
+                  </m:oMathPara>
+                </a14:m>
+                <a:endParaRPr lang="en-US" sz="7200" dirty="0"/>
+              </a:p>
+            </p:txBody>
+          </p:sp>
+        </mc:Choice>
+        <mc:Fallback>
+          <p:sp>
+            <p:nvSpPr>
+              <p:cNvPr id="6" name="TextBox 5">
+                <a:extLst>
+                  <a:ext uri="{FF2B5EF4-FFF2-40B4-BE49-F238E27FC236}">
+                    <a16:creationId xmlns:a16="http://schemas.microsoft.com/office/drawing/2014/main" id="{3BF4F84D-3535-A401-3C92-B2D258FEFCAD}"/>
+                  </a:ext>
+                </a:extLst>
+              </p:cNvPr>
+              <p:cNvSpPr txBox="1">
+                <a:spLocks noRot="1" noChangeAspect="1" noMove="1" noResize="1" noEditPoints="1" noAdjustHandles="1" noChangeArrowheads="1" noChangeShapeType="1" noTextEdit="1"/>
+              </p:cNvSpPr>
+              <p:nvPr/>
+            </p:nvSpPr>
+            <p:spPr>
+              <a:xfrm>
+                <a:off x="5706370" y="5575457"/>
+                <a:ext cx="1051891" cy="1200329"/>
+              </a:xfrm>
+              <a:prstGeom prst="rect">
+                <a:avLst/>
+              </a:prstGeom>
+              <a:blipFill>
+                <a:blip r:embed="rId9"/>
+                <a:stretch>
+                  <a:fillRect l="-3571" r="-2381"/>
+                </a:stretch>
+              </a:blipFill>
+            </p:spPr>
+            <p:txBody>
+              <a:bodyPr/>
+              <a:lstStyle/>
+              <a:p>
+                <a:r>
+                  <a:rPr lang="en-US">
+                    <a:noFill/>
+                  </a:rPr>
+                  <a:t> </a:t>
+                </a:r>
+              </a:p>
+            </p:txBody>
+          </p:sp>
+        </mc:Fallback>
+      </mc:AlternateContent>
+      <p:sp>
+        <p:nvSpPr>
+          <p:cNvPr id="20" name="TextBox 19">
+            <a:extLst>
+              <a:ext uri="{FF2B5EF4-FFF2-40B4-BE49-F238E27FC236}">
+                <a16:creationId xmlns:a16="http://schemas.microsoft.com/office/drawing/2014/main" id="{8E5EDB5B-0BE4-572D-B627-99C881DF3B91}"/>
+              </a:ext>
+            </a:extLst>
+          </p:cNvPr>
+          <p:cNvSpPr txBox="1"/>
+          <p:nvPr/>
+        </p:nvSpPr>
+        <p:spPr>
+          <a:xfrm>
+            <a:off x="4505284" y="5630496"/>
+            <a:ext cx="864339" cy="1200329"/>
+          </a:xfrm>
+          <a:prstGeom prst="rect">
+            <a:avLst/>
+          </a:prstGeom>
+          <a:noFill/>
+        </p:spPr>
+        <p:txBody>
+          <a:bodyPr wrap="none" rtlCol="0">
+            <a:spAutoFit/>
+          </a:bodyPr>
+          <a:lstStyle/>
+          <a:p>
+            <a:r>
+              <a:rPr lang="en-US" sz="7200" dirty="0">
+                <a:latin typeface="Cambria Math" panose="02040503050406030204" pitchFamily="18" charset="0"/>
+                <a:ea typeface="Cambria Math" panose="02040503050406030204" pitchFamily="18" charset="0"/>
+              </a:rPr>
+              <a:t>≈</a:t>
+            </a:r>
+            <a:endParaRPr lang="en-US" sz="7200" dirty="0"/>
+          </a:p>
+        </p:txBody>
+      </p:sp>
     </p:spTree>
     <p:extLst>
       <p:ext uri="{BB962C8B-B14F-4D97-AF65-F5344CB8AC3E}">
@@ -5868,30 +6352,74 @@
                             </p:childTnLst>
                           </p:cTn>
                         </p:par>
-                      </p:childTnLst>
-                    </p:cTn>
-                  </p:par>
-                  <p:par>
-                    <p:cTn id="18" fill="hold">
-                      <p:stCondLst>
-                        <p:cond delay="indefinite"/>
-                      </p:stCondLst>
-                      <p:childTnLst>
                         <p:par>
-                          <p:cTn id="19" fill="hold">
+                          <p:cTn id="18" fill="hold">
                             <p:stCondLst>
-                              <p:cond delay="0"/>
+                              <p:cond delay="2000"/>
                             </p:stCondLst>
                             <p:childTnLst>
                               <p:par>
-                                <p:cTn id="20" presetID="1" presetClass="exit" presetSubtype="0" fill="hold" nodeType="clickEffect">
+                                <p:cTn id="19" presetID="9" presetClass="entr" presetSubtype="0" fill="hold" grpId="0" nodeType="afterEffect">
                                   <p:stCondLst>
                                     <p:cond delay="0"/>
                                   </p:stCondLst>
                                   <p:childTnLst>
                                     <p:set>
                                       <p:cBhvr>
-                                        <p:cTn id="21" dur="1" fill="hold">
+                                        <p:cTn id="20" dur="1" fill="hold">
+                                          <p:stCondLst>
+                                            <p:cond delay="0"/>
+                                          </p:stCondLst>
+                                        </p:cTn>
+                                        <p:tgtEl>
+                                          <p:spTgt spid="20"/>
+                                        </p:tgtEl>
+                                        <p:attrNameLst>
+                                          <p:attrName>style.visibility</p:attrName>
+                                        </p:attrNameLst>
+                                      </p:cBhvr>
+                                      <p:to>
+                                        <p:strVal val="visible"/>
+                                      </p:to>
+                                    </p:set>
+                                    <p:animEffect transition="in" filter="dissolve">
+                                      <p:cBhvr>
+                                        <p:cTn id="21" dur="500"/>
+                                        <p:tgtEl>
+                                          <p:spTgt spid="20"/>
+                                        </p:tgtEl>
+                                      </p:cBhvr>
+                                    </p:animEffect>
+                                  </p:childTnLst>
+                                </p:cTn>
+                              </p:par>
+                            </p:childTnLst>
+                          </p:cTn>
+                        </p:par>
+                      </p:childTnLst>
+                    </p:cTn>
+                  </p:par>
+                  <p:par>
+                    <p:cTn id="22" fill="hold">
+                      <p:stCondLst>
+                        <p:cond delay="indefinite"/>
+                      </p:stCondLst>
+                      <p:childTnLst>
+                        <p:par>
+                          <p:cTn id="23" fill="hold">
+                            <p:stCondLst>
+                              <p:cond delay="0"/>
+                            </p:stCondLst>
+                            <p:childTnLst>
+                              <p:par>
+                                <p:cTn id="24" presetID="1" presetClass="exit" presetSubtype="0" fill="hold" nodeType="clickEffect">
+                                  <p:stCondLst>
+                                    <p:cond delay="0"/>
+                                  </p:stCondLst>
+                                  <p:childTnLst>
+                                    <p:set>
+                                      <p:cBhvr>
+                                        <p:cTn id="25" dur="1" fill="hold">
                                           <p:stCondLst>
                                             <p:cond delay="0"/>
                                           </p:stCondLst>
@@ -5911,14 +6439,14 @@
                                 </p:cTn>
                               </p:par>
                               <p:par>
-                                <p:cTn id="22" presetID="1" presetClass="exit" presetSubtype="0" fill="hold" nodeType="withEffect">
+                                <p:cTn id="26" presetID="1" presetClass="exit" presetSubtype="0" fill="hold" nodeType="withEffect">
                                   <p:stCondLst>
                                     <p:cond delay="0"/>
                                   </p:stCondLst>
                                   <p:childTnLst>
                                     <p:set>
                                       <p:cBhvr>
-                                        <p:cTn id="23" dur="1" fill="hold">
+                                        <p:cTn id="27" dur="1" fill="hold">
                                           <p:stCondLst>
                                             <p:cond delay="0"/>
                                           </p:stCondLst>
@@ -5938,14 +6466,41 @@
                                 </p:cTn>
                               </p:par>
                               <p:par>
-                                <p:cTn id="24" presetID="9" presetClass="entr" presetSubtype="0" fill="hold" grpId="0" nodeType="withEffect">
+                                <p:cTn id="28" presetID="1" presetClass="exit" presetSubtype="0" fill="hold" grpId="1" nodeType="withEffect">
                                   <p:stCondLst>
                                     <p:cond delay="0"/>
                                   </p:stCondLst>
                                   <p:childTnLst>
                                     <p:set>
                                       <p:cBhvr>
-                                        <p:cTn id="25" dur="1" fill="hold">
+                                        <p:cTn id="29" dur="1" fill="hold">
+                                          <p:stCondLst>
+                                            <p:cond delay="0"/>
+                                          </p:stCondLst>
+                                        </p:cTn>
+                                        <p:tgtEl>
+                                          <p:spTgt spid="20"/>
+                                        </p:tgtEl>
+                                        <p:attrNameLst>
+                                          <p:attrName>style.visibility</p:attrName>
+                                        </p:attrNameLst>
+                                      </p:cBhvr>
+                                      <p:to>
+                                        <p:strVal val="hidden"/>
+                                      </p:to>
+                                    </p:set>
+                                  </p:childTnLst>
+                                </p:cTn>
+                              </p:par>
+                              <p:par>
+                                <p:cTn id="30" presetID="9" presetClass="entr" presetSubtype="0" fill="hold" grpId="0" nodeType="withEffect">
+                                  <p:stCondLst>
+                                    <p:cond delay="0"/>
+                                  </p:stCondLst>
+                                  <p:childTnLst>
+                                    <p:set>
+                                      <p:cBhvr>
+                                        <p:cTn id="31" dur="1" fill="hold">
                                           <p:stCondLst>
                                             <p:cond delay="0"/>
                                           </p:stCondLst>
@@ -5963,7 +6518,7 @@
                                     </p:set>
                                     <p:animEffect transition="in" filter="dissolve">
                                       <p:cBhvr>
-                                        <p:cTn id="26" dur="1000"/>
+                                        <p:cTn id="32" dur="1000"/>
                                         <p:tgtEl>
                                           <p:spTgt spid="28"/>
                                         </p:tgtEl>
@@ -5973,14 +6528,14 @@
                                 </p:cTn>
                               </p:par>
                               <p:par>
-                                <p:cTn id="27" presetID="9" presetClass="entr" presetSubtype="0" fill="hold" nodeType="withEffect">
+                                <p:cTn id="33" presetID="9" presetClass="entr" presetSubtype="0" fill="hold" nodeType="withEffect">
                                   <p:stCondLst>
                                     <p:cond delay="0"/>
                                   </p:stCondLst>
                                   <p:childTnLst>
                                     <p:set>
                                       <p:cBhvr>
-                                        <p:cTn id="28" dur="1" fill="hold">
+                                        <p:cTn id="34" dur="1" fill="hold">
                                           <p:stCondLst>
                                             <p:cond delay="0"/>
                                           </p:stCondLst>
@@ -5998,7 +6553,7 @@
                                     </p:set>
                                     <p:animEffect transition="in" filter="dissolve">
                                       <p:cBhvr>
-                                        <p:cTn id="29" dur="1000"/>
+                                        <p:cTn id="35" dur="1000"/>
                                         <p:tgtEl>
                                           <p:spTgt spid="36"/>
                                         </p:tgtEl>
@@ -6011,20 +6566,20 @@
                           </p:cTn>
                         </p:par>
                         <p:par>
-                          <p:cTn id="30" fill="hold">
+                          <p:cTn id="36" fill="hold">
                             <p:stCondLst>
                               <p:cond delay="1000"/>
                             </p:stCondLst>
                             <p:childTnLst>
                               <p:par>
-                                <p:cTn id="31" presetID="9" presetClass="entr" presetSubtype="0" fill="hold" grpId="0" nodeType="afterEffect">
+                                <p:cTn id="37" presetID="9" presetClass="entr" presetSubtype="0" fill="hold" grpId="0" nodeType="afterEffect">
                                   <p:stCondLst>
                                     <p:cond delay="0"/>
                                   </p:stCondLst>
                                   <p:childTnLst>
                                     <p:set>
                                       <p:cBhvr>
-                                        <p:cTn id="32" dur="1" fill="hold">
+                                        <p:cTn id="38" dur="1" fill="hold">
                                           <p:stCondLst>
                                             <p:cond delay="0"/>
                                           </p:stCondLst>
@@ -6042,7 +6597,7 @@
                                     </p:set>
                                     <p:animEffect transition="in" filter="dissolve">
                                       <p:cBhvr>
-                                        <p:cTn id="33" dur="1000"/>
+                                        <p:cTn id="39" dur="1000"/>
                                         <p:tgtEl>
                                           <p:spTgt spid="27"/>
                                         </p:tgtEl>
@@ -6052,14 +6607,14 @@
                                 </p:cTn>
                               </p:par>
                               <p:par>
-                                <p:cTn id="34" presetID="9" presetClass="entr" presetSubtype="0" fill="hold" nodeType="withEffect">
+                                <p:cTn id="40" presetID="9" presetClass="entr" presetSubtype="0" fill="hold" nodeType="withEffect">
                                   <p:stCondLst>
                                     <p:cond delay="0"/>
                                   </p:stCondLst>
                                   <p:childTnLst>
                                     <p:set>
                                       <p:cBhvr>
-                                        <p:cTn id="35" dur="1" fill="hold">
+                                        <p:cTn id="41" dur="1" fill="hold">
                                           <p:stCondLst>
                                             <p:cond delay="0"/>
                                           </p:stCondLst>
@@ -6077,9 +6632,53 @@
                                     </p:set>
                                     <p:animEffect transition="in" filter="dissolve">
                                       <p:cBhvr>
-                                        <p:cTn id="36" dur="1000"/>
+                                        <p:cTn id="42" dur="1000"/>
                                         <p:tgtEl>
                                           <p:spTgt spid="31"/>
+                                        </p:tgtEl>
+                                      </p:cBhvr>
+                                    </p:animEffect>
+                                  </p:childTnLst>
+                                </p:cTn>
+                              </p:par>
+                            </p:childTnLst>
+                          </p:cTn>
+                        </p:par>
+                        <p:par>
+                          <p:cTn id="43" fill="hold">
+                            <p:stCondLst>
+                              <p:cond delay="2000"/>
+                            </p:stCondLst>
+                            <p:childTnLst>
+                              <p:par>
+                                <p:cTn id="44" presetID="9" presetClass="entr" presetSubtype="0" fill="hold" grpId="2" nodeType="afterEffect">
+                                  <p:stCondLst>
+                                    <p:cond delay="0"/>
+                                  </p:stCondLst>
+                                  <p:childTnLst>
+                                    <p:set>
+                                      <p:cBhvr>
+                                        <p:cTn id="45" dur="1" fill="hold">
+                                          <p:stCondLst>
+                                            <p:cond delay="0"/>
+                                          </p:stCondLst>
+                                        </p:cTn>
+                                        <p:tgtEl>
+                                          <p:spTgt spid="6"/>
+                                        </p:tgtEl>
+                                        <p:attrNameLst>
+                                          <p:attrName>style.visibility</p:attrName>
+                                        </p:attrNameLst>
+                                      </p:cBhvr>
+                                      <p:to>
+                                        <p:strVal val="visible"/>
+                                      </p:to>
+                                    </p:set>
+                                    <p:animEffect transition="in" filter="dissolve">
+                                      <p:cBhvr>
+                                        <p:cTn id="46" dur="500"/>
+                                        <p:tgtEl>
+                                          <p:spTgt spid="6"/>
                                         </p:tgtEl>
                                       </p:cBhvr>
                                     </p:animEffect>
@@ -6118,6 +6717,9 @@
       <p:bldP spid="26" grpId="0" animBg="1"/>
       <p:bldP spid="27" grpId="0" animBg="1"/>
       <p:bldP spid="28" grpId="0" animBg="1"/>
+      <p:bldP spid="6" grpId="2"/>
+      <p:bldP spid="20" grpId="0"/>
+      <p:bldP spid="20" grpId="1"/>
     </p:bldLst>
   </p:timing>
 </p:sld>
@@ -6140,6 +6742,1105 @@
           <a:chExt cx="0" cy="0"/>
         </a:xfrm>
       </p:grpSpPr>
+      <mc:AlternateContent xmlns:mc="http://schemas.openxmlformats.org/markup-compatibility/2006">
+        <mc:Choice xmlns:a14="http://schemas.microsoft.com/office/drawing/2010/main" Requires="a14">
+          <p:sp>
+            <p:nvSpPr>
+              <p:cNvPr id="2" name="Title 1">
+                <a:extLst>
+                  <a:ext uri="{FF2B5EF4-FFF2-40B4-BE49-F238E27FC236}">
+                    <a16:creationId xmlns:a16="http://schemas.microsoft.com/office/drawing/2014/main" id="{B620B024-7623-4738-F93B-548E0EBB23A3}"/>
+                  </a:ext>
+                </a:extLst>
+              </p:cNvPr>
+              <p:cNvSpPr>
+                <a:spLocks noGrp="1"/>
+              </p:cNvSpPr>
+              <p:nvPr>
+                <p:ph type="title"/>
+              </p:nvPr>
+            </p:nvSpPr>
+            <p:spPr>
+              <a:xfrm>
+                <a:off x="609600" y="365125"/>
+                <a:ext cx="10942320" cy="1325563"/>
+              </a:xfrm>
+            </p:spPr>
+            <p:txBody>
+              <a:bodyPr/>
+              <a:lstStyle/>
+              <a:p>
+                <a:r>
+                  <a:rPr lang="en-US" dirty="0"/>
+                  <a:t>Aside: indistinguishability (</a:t>
+                </a:r>
+                <a14:m>
+                  <m:oMath xmlns:m="http://schemas.openxmlformats.org/officeDocument/2006/math">
+                    <m:r>
+                      <a:rPr lang="en-US" b="0" i="1" smtClean="0">
+                        <a:latin typeface="Cambria Math" panose="02040503050406030204" pitchFamily="18" charset="0"/>
+                        <a:ea typeface="Cambria Math" panose="02040503050406030204" pitchFamily="18" charset="0"/>
+                      </a:rPr>
+                      <m:t>~</m:t>
+                    </m:r>
+                  </m:oMath>
+                </a14:m>
+                <a:r>
+                  <a:rPr lang="en-US" dirty="0"/>
+                  <a:t>) is not equality (=)</a:t>
+                </a:r>
+              </a:p>
+            </p:txBody>
+          </p:sp>
+        </mc:Choice>
+        <mc:Fallback>
+          <p:sp>
+            <p:nvSpPr>
+              <p:cNvPr id="2" name="Title 1">
+                <a:extLst>
+                  <a:ext uri="{FF2B5EF4-FFF2-40B4-BE49-F238E27FC236}">
+                    <a16:creationId xmlns:a16="http://schemas.microsoft.com/office/drawing/2014/main" id="{B620B024-7623-4738-F93B-548E0EBB23A3}"/>
+                  </a:ext>
+                </a:extLst>
+              </p:cNvPr>
+              <p:cNvSpPr>
+                <a:spLocks noGrp="1" noRot="1" noChangeAspect="1" noMove="1" noResize="1" noEditPoints="1" noAdjustHandles="1" noChangeArrowheads="1" noChangeShapeType="1" noTextEdit="1"/>
+              </p:cNvSpPr>
+              <p:nvPr>
+                <p:ph type="title"/>
+              </p:nvPr>
+            </p:nvSpPr>
+            <p:spPr>
+              <a:xfrm>
+                <a:off x="609600" y="365125"/>
+                <a:ext cx="10942320" cy="1325563"/>
+              </a:xfrm>
+              <a:blipFill>
+                <a:blip r:embed="rId2"/>
+                <a:stretch>
+                  <a:fillRect l="-2320"/>
+                </a:stretch>
+              </a:blipFill>
+            </p:spPr>
+            <p:txBody>
+              <a:bodyPr/>
+              <a:lstStyle/>
+              <a:p>
+                <a:r>
+                  <a:rPr lang="en-US">
+                    <a:noFill/>
+                  </a:rPr>
+                  <a:t> </a:t>
+                </a:r>
+              </a:p>
+            </p:txBody>
+          </p:sp>
+        </mc:Fallback>
+      </mc:AlternateContent>
+      <p:sp>
+        <p:nvSpPr>
+          <p:cNvPr id="4" name="TextBox 3">
+            <a:extLst>
+              <a:ext uri="{FF2B5EF4-FFF2-40B4-BE49-F238E27FC236}">
+                <a16:creationId xmlns:a16="http://schemas.microsoft.com/office/drawing/2014/main" id="{74E964DD-A8B5-88A0-E589-64F1625619D5}"/>
+              </a:ext>
+            </a:extLst>
+          </p:cNvPr>
+          <p:cNvSpPr txBox="1"/>
+          <p:nvPr/>
+        </p:nvSpPr>
+        <p:spPr>
+          <a:xfrm>
+            <a:off x="2377440" y="1873839"/>
+            <a:ext cx="1441420" cy="523220"/>
+          </a:xfrm>
+          <a:prstGeom prst="rect">
+            <a:avLst/>
+          </a:prstGeom>
+          <a:noFill/>
+        </p:spPr>
+        <p:txBody>
+          <a:bodyPr wrap="none" rtlCol="0">
+            <a:spAutoFit/>
+          </a:bodyPr>
+          <a:lstStyle/>
+          <a:p>
+            <a:r>
+              <a:rPr lang="en-US" sz="2800" dirty="0"/>
+              <a:t>“Hello!”</a:t>
+            </a:r>
+          </a:p>
+        </p:txBody>
+      </p:sp>
+      <p:sp>
+        <p:nvSpPr>
+          <p:cNvPr id="5" name="TextBox 4">
+            <a:extLst>
+              <a:ext uri="{FF2B5EF4-FFF2-40B4-BE49-F238E27FC236}">
+                <a16:creationId xmlns:a16="http://schemas.microsoft.com/office/drawing/2014/main" id="{A350C17F-F895-3F76-3C75-44BF2F1EB32E}"/>
+              </a:ext>
+            </a:extLst>
+          </p:cNvPr>
+          <p:cNvSpPr txBox="1"/>
+          <p:nvPr/>
+        </p:nvSpPr>
+        <p:spPr>
+          <a:xfrm>
+            <a:off x="7477760" y="1873839"/>
+            <a:ext cx="1463862" cy="523220"/>
+          </a:xfrm>
+          <a:prstGeom prst="rect">
+            <a:avLst/>
+          </a:prstGeom>
+          <a:noFill/>
+        </p:spPr>
+        <p:txBody>
+          <a:bodyPr wrap="none" rtlCol="0">
+            <a:spAutoFit/>
+          </a:bodyPr>
+          <a:lstStyle/>
+          <a:p>
+            <a:r>
+              <a:rPr lang="en-US" sz="2800" dirty="0"/>
+              <a:t>“Adios!”</a:t>
+            </a:r>
+          </a:p>
+        </p:txBody>
+      </p:sp>
+      <p:sp>
+        <p:nvSpPr>
+          <p:cNvPr id="6" name="TextBox 5">
+            <a:extLst>
+              <a:ext uri="{FF2B5EF4-FFF2-40B4-BE49-F238E27FC236}">
+                <a16:creationId xmlns:a16="http://schemas.microsoft.com/office/drawing/2014/main" id="{D750B038-FF03-3646-893E-95737D50E751}"/>
+              </a:ext>
+            </a:extLst>
+          </p:cNvPr>
+          <p:cNvSpPr txBox="1"/>
+          <p:nvPr/>
+        </p:nvSpPr>
+        <p:spPr>
+          <a:xfrm>
+            <a:off x="3028489" y="4032725"/>
+            <a:ext cx="5413661" cy="461665"/>
+          </a:xfrm>
+          <a:prstGeom prst="rect">
+            <a:avLst/>
+          </a:prstGeom>
+          <a:noFill/>
+        </p:spPr>
+        <p:txBody>
+          <a:bodyPr wrap="none" rtlCol="0">
+            <a:spAutoFit/>
+          </a:bodyPr>
+          <a:lstStyle/>
+          <a:p>
+            <a:r>
+              <a:rPr lang="en-US" sz="2400" dirty="0"/>
+              <a:t>b55e47d429908ebd098e90e16f86488a</a:t>
+            </a:r>
+          </a:p>
+        </p:txBody>
+      </p:sp>
+      <p:grpSp>
+        <p:nvGrpSpPr>
+          <p:cNvPr id="9" name="Group 8">
+            <a:extLst>
+              <a:ext uri="{FF2B5EF4-FFF2-40B4-BE49-F238E27FC236}">
+                <a16:creationId xmlns:a16="http://schemas.microsoft.com/office/drawing/2014/main" id="{4B0FD7EC-7391-9A28-9AC2-6A174AC93076}"/>
+              </a:ext>
+            </a:extLst>
+          </p:cNvPr>
+          <p:cNvGrpSpPr/>
+          <p:nvPr/>
+        </p:nvGrpSpPr>
+        <p:grpSpPr>
+          <a:xfrm>
+            <a:off x="4643119" y="3221246"/>
+            <a:ext cx="2184400" cy="415508"/>
+            <a:chOff x="4632959" y="3261359"/>
+            <a:chExt cx="2184400" cy="415508"/>
+          </a:xfrm>
+        </p:grpSpPr>
+        <p:sp>
+          <p:nvSpPr>
+            <p:cNvPr id="7" name="Rectangle 6">
+              <a:extLst>
+                <a:ext uri="{FF2B5EF4-FFF2-40B4-BE49-F238E27FC236}">
+                  <a16:creationId xmlns:a16="http://schemas.microsoft.com/office/drawing/2014/main" id="{91A55DAA-6D3E-2984-2A00-768FDB13F8E9}"/>
+                </a:ext>
+              </a:extLst>
+            </p:cNvPr>
+            <p:cNvSpPr/>
+            <p:nvPr/>
+          </p:nvSpPr>
+          <p:spPr>
+            <a:xfrm>
+              <a:off x="4632959" y="3280627"/>
+              <a:ext cx="2184400" cy="396240"/>
+            </a:xfrm>
+            <a:prstGeom prst="rect">
+              <a:avLst/>
+            </a:prstGeom>
+          </p:spPr>
+          <p:style>
+            <a:lnRef idx="2">
+              <a:schemeClr val="accent1">
+                <a:shade val="15000"/>
+              </a:schemeClr>
+            </a:lnRef>
+            <a:fillRef idx="1">
+              <a:schemeClr val="accent1"/>
+            </a:fillRef>
+            <a:effectRef idx="0">
+              <a:schemeClr val="accent1"/>
+            </a:effectRef>
+            <a:fontRef idx="minor">
+              <a:schemeClr val="lt1"/>
+            </a:fontRef>
+          </p:style>
+          <p:txBody>
+            <a:bodyPr rtlCol="0" anchor="ctr"/>
+            <a:lstStyle/>
+            <a:p>
+              <a:pPr algn="ctr"/>
+              <a:r>
+                <a:rPr lang="en-US" dirty="0"/>
+                <a:t>Encrypt</a:t>
+              </a:r>
+            </a:p>
+          </p:txBody>
+        </p:sp>
+        <p:pic>
+          <p:nvPicPr>
+            <p:cNvPr id="8" name="Graphic 7" descr="Lock with solid fill">
+              <a:extLst>
+                <a:ext uri="{FF2B5EF4-FFF2-40B4-BE49-F238E27FC236}">
+                  <a16:creationId xmlns:a16="http://schemas.microsoft.com/office/drawing/2014/main" id="{DD9B3E88-C1FA-D363-C2C3-C6D28768D7DD}"/>
+                </a:ext>
+              </a:extLst>
+            </p:cNvPr>
+            <p:cNvPicPr>
+              <a:picLocks noChangeAspect="1"/>
+            </p:cNvPicPr>
+            <p:nvPr/>
+          </p:nvPicPr>
+          <p:blipFill>
+            <a:blip r:embed="rId3">
+              <a:extLst>
+                <a:ext uri="{96DAC541-7B7A-43D3-8B79-37D633B846F1}">
+                  <asvg:svgBlip xmlns:asvg="http://schemas.microsoft.com/office/drawing/2016/SVG/main" r:embed="rId4"/>
+                </a:ext>
+              </a:extLst>
+            </a:blip>
+            <a:stretch>
+              <a:fillRect/>
+            </a:stretch>
+          </p:blipFill>
+          <p:spPr>
+            <a:xfrm>
+              <a:off x="4978399" y="3261359"/>
+              <a:ext cx="375921" cy="375921"/>
+            </a:xfrm>
+            <a:prstGeom prst="rect">
+              <a:avLst/>
+            </a:prstGeom>
+          </p:spPr>
+        </p:pic>
+      </p:grpSp>
+      <p:cxnSp>
+        <p:nvCxnSpPr>
+          <p:cNvPr id="10" name="Straight Arrow Connector 9">
+            <a:extLst>
+              <a:ext uri="{FF2B5EF4-FFF2-40B4-BE49-F238E27FC236}">
+                <a16:creationId xmlns:a16="http://schemas.microsoft.com/office/drawing/2014/main" id="{19499199-78AC-A8B1-C613-3582C80D121D}"/>
+              </a:ext>
+            </a:extLst>
+          </p:cNvPr>
+          <p:cNvCxnSpPr>
+            <a:cxnSpLocks/>
+            <a:stCxn id="7" idx="2"/>
+            <a:endCxn id="6" idx="0"/>
+          </p:cNvCxnSpPr>
+          <p:nvPr/>
+        </p:nvCxnSpPr>
+        <p:spPr>
+          <a:xfrm>
+            <a:off x="5735319" y="3636754"/>
+            <a:ext cx="1" cy="395971"/>
+          </a:xfrm>
+          <a:prstGeom prst="straightConnector1">
+            <a:avLst/>
+          </a:prstGeom>
+          <a:ln w="38100">
+            <a:tailEnd type="triangle"/>
+          </a:ln>
+        </p:spPr>
+        <p:style>
+          <a:lnRef idx="2">
+            <a:schemeClr val="accent1"/>
+          </a:lnRef>
+          <a:fillRef idx="0">
+            <a:schemeClr val="accent1"/>
+          </a:fillRef>
+          <a:effectRef idx="1">
+            <a:schemeClr val="accent1"/>
+          </a:effectRef>
+          <a:fontRef idx="minor">
+            <a:schemeClr val="tx1"/>
+          </a:fontRef>
+        </p:style>
+      </p:cxnSp>
+      <p:cxnSp>
+        <p:nvCxnSpPr>
+          <p:cNvPr id="14" name="Straight Arrow Connector 13">
+            <a:extLst>
+              <a:ext uri="{FF2B5EF4-FFF2-40B4-BE49-F238E27FC236}">
+                <a16:creationId xmlns:a16="http://schemas.microsoft.com/office/drawing/2014/main" id="{719F188B-C997-C660-D6E9-53BAEC9F4EA1}"/>
+              </a:ext>
+            </a:extLst>
+          </p:cNvPr>
+          <p:cNvCxnSpPr>
+            <a:cxnSpLocks/>
+            <a:stCxn id="4" idx="2"/>
+          </p:cNvCxnSpPr>
+          <p:nvPr/>
+        </p:nvCxnSpPr>
+        <p:spPr>
+          <a:xfrm>
+            <a:off x="3098150" y="2397059"/>
+            <a:ext cx="1706362" cy="824187"/>
+          </a:xfrm>
+          <a:prstGeom prst="straightConnector1">
+            <a:avLst/>
+          </a:prstGeom>
+          <a:ln w="38100">
+            <a:solidFill>
+              <a:schemeClr val="accent2"/>
+            </a:solidFill>
+            <a:prstDash val="sysDot"/>
+            <a:tailEnd type="triangle"/>
+          </a:ln>
+        </p:spPr>
+        <p:style>
+          <a:lnRef idx="2">
+            <a:schemeClr val="accent1"/>
+          </a:lnRef>
+          <a:fillRef idx="0">
+            <a:schemeClr val="accent1"/>
+          </a:fillRef>
+          <a:effectRef idx="1">
+            <a:schemeClr val="accent1"/>
+          </a:effectRef>
+          <a:fontRef idx="minor">
+            <a:schemeClr val="tx1"/>
+          </a:fontRef>
+        </p:style>
+      </p:cxnSp>
+      <p:cxnSp>
+        <p:nvCxnSpPr>
+          <p:cNvPr id="17" name="Straight Arrow Connector 16">
+            <a:extLst>
+              <a:ext uri="{FF2B5EF4-FFF2-40B4-BE49-F238E27FC236}">
+                <a16:creationId xmlns:a16="http://schemas.microsoft.com/office/drawing/2014/main" id="{FAC26B94-86EA-0D3D-1142-F24583E5BB29}"/>
+              </a:ext>
+            </a:extLst>
+          </p:cNvPr>
+          <p:cNvCxnSpPr>
+            <a:cxnSpLocks/>
+            <a:stCxn id="5" idx="2"/>
+          </p:cNvCxnSpPr>
+          <p:nvPr/>
+        </p:nvCxnSpPr>
+        <p:spPr>
+          <a:xfrm flipH="1">
+            <a:off x="6664960" y="2397059"/>
+            <a:ext cx="1544731" cy="824187"/>
+          </a:xfrm>
+          <a:prstGeom prst="straightConnector1">
+            <a:avLst/>
+          </a:prstGeom>
+          <a:ln w="38100">
+            <a:solidFill>
+              <a:schemeClr val="accent2"/>
+            </a:solidFill>
+            <a:prstDash val="sysDot"/>
+            <a:tailEnd type="triangle"/>
+          </a:ln>
+        </p:spPr>
+        <p:style>
+          <a:lnRef idx="2">
+            <a:schemeClr val="accent1"/>
+          </a:lnRef>
+          <a:fillRef idx="0">
+            <a:schemeClr val="accent1"/>
+          </a:fillRef>
+          <a:effectRef idx="1">
+            <a:schemeClr val="accent1"/>
+          </a:effectRef>
+          <a:fontRef idx="minor">
+            <a:schemeClr val="tx1"/>
+          </a:fontRef>
+        </p:style>
+      </p:cxnSp>
+      <p:sp>
+        <p:nvSpPr>
+          <p:cNvPr id="20" name="TextBox 19">
+            <a:extLst>
+              <a:ext uri="{FF2B5EF4-FFF2-40B4-BE49-F238E27FC236}">
+                <a16:creationId xmlns:a16="http://schemas.microsoft.com/office/drawing/2014/main" id="{D0A8D35F-77FC-1FD4-2B6D-3C99BFF21021}"/>
+              </a:ext>
+            </a:extLst>
+          </p:cNvPr>
+          <p:cNvSpPr txBox="1"/>
+          <p:nvPr/>
+        </p:nvSpPr>
+        <p:spPr>
+          <a:xfrm>
+            <a:off x="4110601" y="2160757"/>
+            <a:ext cx="532518" cy="923330"/>
+          </a:xfrm>
+          <a:prstGeom prst="rect">
+            <a:avLst/>
+          </a:prstGeom>
+          <a:noFill/>
+        </p:spPr>
+        <p:txBody>
+          <a:bodyPr wrap="none" rtlCol="0">
+            <a:spAutoFit/>
+          </a:bodyPr>
+          <a:lstStyle/>
+          <a:p>
+            <a:r>
+              <a:rPr lang="en-US" sz="5400" dirty="0">
+                <a:solidFill>
+                  <a:schemeClr val="accent2"/>
+                </a:solidFill>
+              </a:rPr>
+              <a:t>?</a:t>
+            </a:r>
+          </a:p>
+        </p:txBody>
+      </p:sp>
+      <p:sp>
+        <p:nvSpPr>
+          <p:cNvPr id="21" name="TextBox 20">
+            <a:extLst>
+              <a:ext uri="{FF2B5EF4-FFF2-40B4-BE49-F238E27FC236}">
+                <a16:creationId xmlns:a16="http://schemas.microsoft.com/office/drawing/2014/main" id="{7A8CA436-59B0-9DBB-6C35-BBA7C0BBC598}"/>
+              </a:ext>
+            </a:extLst>
+          </p:cNvPr>
+          <p:cNvSpPr txBox="1"/>
+          <p:nvPr/>
+        </p:nvSpPr>
+        <p:spPr>
+          <a:xfrm>
+            <a:off x="6875292" y="2160757"/>
+            <a:ext cx="532518" cy="923330"/>
+          </a:xfrm>
+          <a:prstGeom prst="rect">
+            <a:avLst/>
+          </a:prstGeom>
+          <a:noFill/>
+        </p:spPr>
+        <p:txBody>
+          <a:bodyPr wrap="none" rtlCol="0">
+            <a:spAutoFit/>
+          </a:bodyPr>
+          <a:lstStyle/>
+          <a:p>
+            <a:r>
+              <a:rPr lang="en-US" sz="5400" dirty="0">
+                <a:solidFill>
+                  <a:schemeClr val="accent2"/>
+                </a:solidFill>
+              </a:rPr>
+              <a:t>?</a:t>
+            </a:r>
+          </a:p>
+        </p:txBody>
+      </p:sp>
+      <p:sp>
+        <p:nvSpPr>
+          <p:cNvPr id="25" name="TextBox 24">
+            <a:extLst>
+              <a:ext uri="{FF2B5EF4-FFF2-40B4-BE49-F238E27FC236}">
+                <a16:creationId xmlns:a16="http://schemas.microsoft.com/office/drawing/2014/main" id="{3C12C8CD-752C-92C2-6487-9FC72EEB4697}"/>
+              </a:ext>
+            </a:extLst>
+          </p:cNvPr>
+          <p:cNvSpPr txBox="1"/>
+          <p:nvPr/>
+        </p:nvSpPr>
+        <p:spPr>
+          <a:xfrm>
+            <a:off x="838200" y="5010810"/>
+            <a:ext cx="10713720" cy="523220"/>
+          </a:xfrm>
+          <a:prstGeom prst="rect">
+            <a:avLst/>
+          </a:prstGeom>
+          <a:noFill/>
+        </p:spPr>
+        <p:txBody>
+          <a:bodyPr wrap="square" rtlCol="0">
+            <a:spAutoFit/>
+          </a:bodyPr>
+          <a:lstStyle/>
+          <a:p>
+            <a:r>
+              <a:rPr lang="en-US" sz="2800" i="1" dirty="0"/>
+              <a:t>Secure encryption leaks negligible info about the encrypted message</a:t>
+            </a:r>
+          </a:p>
+        </p:txBody>
+      </p:sp>
+      <mc:AlternateContent xmlns:mc="http://schemas.openxmlformats.org/markup-compatibility/2006">
+        <mc:Choice xmlns:a14="http://schemas.microsoft.com/office/drawing/2010/main" Requires="a14">
+          <p:sp>
+            <p:nvSpPr>
+              <p:cNvPr id="26" name="TextBox 25">
+                <a:extLst>
+                  <a:ext uri="{FF2B5EF4-FFF2-40B4-BE49-F238E27FC236}">
+                    <a16:creationId xmlns:a16="http://schemas.microsoft.com/office/drawing/2014/main" id="{99C7CA47-6775-C695-FB0E-DD8747B32E50}"/>
+                  </a:ext>
+                </a:extLst>
+              </p:cNvPr>
+              <p:cNvSpPr txBox="1"/>
+              <p:nvPr/>
+            </p:nvSpPr>
+            <p:spPr>
+              <a:xfrm>
+                <a:off x="2452823" y="5668391"/>
+                <a:ext cx="6564992" cy="674352"/>
+              </a:xfrm>
+              <a:prstGeom prst="rect">
+                <a:avLst/>
+              </a:prstGeom>
+              <a:noFill/>
+            </p:spPr>
+            <p:txBody>
+              <a:bodyPr wrap="square">
+                <a:spAutoFit/>
+              </a:bodyPr>
+              <a:lstStyle/>
+              <a:p>
+                <a:pPr>
+                  <a:lnSpc>
+                    <a:spcPct val="150000"/>
+                  </a:lnSpc>
+                </a:pPr>
+                <a:r>
+                  <a:rPr lang="en-US" sz="2800" dirty="0"/>
+                  <a:t>In our model:</a:t>
+                </a:r>
+                <a:r>
+                  <a:rPr lang="en-US" sz="2800" dirty="0">
+                    <a:solidFill>
+                      <a:schemeClr val="accent6"/>
+                    </a:solidFill>
+                  </a:rPr>
+                  <a:t>   </a:t>
+                </a:r>
+                <a14:m>
+                  <m:oMath xmlns:m="http://schemas.openxmlformats.org/officeDocument/2006/math">
+                    <m:r>
+                      <a:rPr lang="en-US" sz="2800" b="0" i="0" dirty="0" smtClean="0">
+                        <a:solidFill>
+                          <a:schemeClr val="accent6"/>
+                        </a:solidFill>
+                        <a:latin typeface="Cambria Math" panose="02040503050406030204" pitchFamily="18" charset="0"/>
+                      </a:rPr>
+                      <m:t>[</m:t>
+                    </m:r>
+                    <m:r>
+                      <a:rPr lang="en-US" sz="2800" i="1" dirty="0" smtClean="0">
+                        <a:solidFill>
+                          <a:schemeClr val="accent6"/>
+                        </a:solidFill>
+                        <a:latin typeface="Cambria Math" panose="02040503050406030204" pitchFamily="18" charset="0"/>
+                      </a:rPr>
+                      <m:t>𝑒𝑛𝑐</m:t>
+                    </m:r>
+                    <m:r>
+                      <a:rPr lang="en-US" sz="2800" i="1" dirty="0">
+                        <a:solidFill>
+                          <a:schemeClr val="accent6"/>
+                        </a:solidFill>
+                        <a:latin typeface="Cambria Math" panose="02040503050406030204" pitchFamily="18" charset="0"/>
+                      </a:rPr>
+                      <m:t>(</m:t>
+                    </m:r>
+                    <m:r>
+                      <a:rPr lang="en-US" sz="2800" i="1" dirty="0">
+                        <a:solidFill>
+                          <a:schemeClr val="accent6"/>
+                        </a:solidFill>
+                        <a:latin typeface="Cambria Math" panose="02040503050406030204" pitchFamily="18" charset="0"/>
+                      </a:rPr>
+                      <m:t>𝑚</m:t>
+                    </m:r>
+                    <m:r>
+                      <a:rPr lang="en-US" sz="2800" i="1" dirty="0">
+                        <a:solidFill>
+                          <a:schemeClr val="accent6"/>
+                        </a:solidFill>
+                        <a:latin typeface="Cambria Math" panose="02040503050406030204" pitchFamily="18" charset="0"/>
+                      </a:rPr>
+                      <m:t>, </m:t>
+                    </m:r>
+                    <m:r>
+                      <a:rPr lang="en-US" sz="2800" i="1" dirty="0">
+                        <a:solidFill>
+                          <a:schemeClr val="accent6"/>
+                        </a:solidFill>
+                        <a:latin typeface="Cambria Math" panose="02040503050406030204" pitchFamily="18" charset="0"/>
+                      </a:rPr>
+                      <m:t>𝑘</m:t>
+                    </m:r>
+                    <m:r>
+                      <a:rPr lang="en-US" sz="2800" i="1" dirty="0">
+                        <a:solidFill>
+                          <a:schemeClr val="accent6"/>
+                        </a:solidFill>
+                        <a:latin typeface="Cambria Math" panose="02040503050406030204" pitchFamily="18" charset="0"/>
+                      </a:rPr>
+                      <m:t>)] ~ [</m:t>
+                    </m:r>
+                    <m:r>
+                      <a:rPr lang="en-US" sz="2800" i="1" dirty="0">
+                        <a:solidFill>
+                          <a:schemeClr val="accent6"/>
+                        </a:solidFill>
+                        <a:latin typeface="Cambria Math" panose="02040503050406030204" pitchFamily="18" charset="0"/>
+                      </a:rPr>
+                      <m:t>𝑒𝑛𝑐</m:t>
+                    </m:r>
+                    <m:r>
+                      <a:rPr lang="en-US" sz="2800" i="1" dirty="0">
+                        <a:solidFill>
+                          <a:schemeClr val="accent6"/>
+                        </a:solidFill>
+                        <a:latin typeface="Cambria Math" panose="02040503050406030204" pitchFamily="18" charset="0"/>
+                      </a:rPr>
+                      <m:t>(</m:t>
+                    </m:r>
+                    <m:r>
+                      <a:rPr lang="en-US" sz="2800" i="1" dirty="0">
+                        <a:solidFill>
+                          <a:schemeClr val="accent6"/>
+                        </a:solidFill>
+                        <a:latin typeface="Cambria Math" panose="02040503050406030204" pitchFamily="18" charset="0"/>
+                      </a:rPr>
+                      <m:t>𝑚</m:t>
+                    </m:r>
+                    <m:r>
+                      <a:rPr lang="en-US" sz="2800" b="0" i="1" dirty="0" smtClean="0">
+                        <a:solidFill>
+                          <a:schemeClr val="accent6"/>
+                        </a:solidFill>
+                        <a:latin typeface="Cambria Math" panose="02040503050406030204" pitchFamily="18" charset="0"/>
+                      </a:rPr>
+                      <m:t>’</m:t>
+                    </m:r>
+                    <m:r>
+                      <a:rPr lang="en-US" sz="2800" i="1" dirty="0">
+                        <a:solidFill>
+                          <a:schemeClr val="accent6"/>
+                        </a:solidFill>
+                        <a:latin typeface="Cambria Math" panose="02040503050406030204" pitchFamily="18" charset="0"/>
+                      </a:rPr>
+                      <m:t>, </m:t>
+                    </m:r>
+                    <m:r>
+                      <a:rPr lang="en-US" sz="2800" i="1" dirty="0">
+                        <a:solidFill>
+                          <a:schemeClr val="accent6"/>
+                        </a:solidFill>
+                        <a:latin typeface="Cambria Math" panose="02040503050406030204" pitchFamily="18" charset="0"/>
+                      </a:rPr>
+                      <m:t>𝑘</m:t>
+                    </m:r>
+                    <m:r>
+                      <a:rPr lang="en-US" sz="2800" b="0" i="1" dirty="0" smtClean="0">
+                        <a:solidFill>
+                          <a:schemeClr val="accent6"/>
+                        </a:solidFill>
+                        <a:latin typeface="Cambria Math" panose="02040503050406030204" pitchFamily="18" charset="0"/>
+                      </a:rPr>
+                      <m:t>’</m:t>
+                    </m:r>
+                    <m:r>
+                      <a:rPr lang="en-US" sz="2800" i="1" dirty="0">
+                        <a:solidFill>
+                          <a:schemeClr val="accent6"/>
+                        </a:solidFill>
+                        <a:latin typeface="Cambria Math" panose="02040503050406030204" pitchFamily="18" charset="0"/>
+                      </a:rPr>
+                      <m:t>)</m:t>
+                    </m:r>
+                    <m:r>
+                      <a:rPr lang="en-US" sz="2800" b="0" i="1" dirty="0" smtClean="0">
+                        <a:solidFill>
+                          <a:schemeClr val="accent6"/>
+                        </a:solidFill>
+                        <a:latin typeface="Cambria Math" panose="02040503050406030204" pitchFamily="18" charset="0"/>
+                      </a:rPr>
+                      <m:t>]</m:t>
+                    </m:r>
+                  </m:oMath>
+                </a14:m>
+                <a:endParaRPr lang="en-US" sz="2000" dirty="0">
+                  <a:solidFill>
+                    <a:schemeClr val="accent6"/>
+                  </a:solidFill>
+                </a:endParaRPr>
+              </a:p>
+            </p:txBody>
+          </p:sp>
+        </mc:Choice>
+        <mc:Fallback>
+          <p:sp>
+            <p:nvSpPr>
+              <p:cNvPr id="26" name="TextBox 25">
+                <a:extLst>
+                  <a:ext uri="{FF2B5EF4-FFF2-40B4-BE49-F238E27FC236}">
+                    <a16:creationId xmlns:a16="http://schemas.microsoft.com/office/drawing/2014/main" id="{99C7CA47-6775-C695-FB0E-DD8747B32E50}"/>
+                  </a:ext>
+                </a:extLst>
+              </p:cNvPr>
+              <p:cNvSpPr txBox="1">
+                <a:spLocks noRot="1" noChangeAspect="1" noMove="1" noResize="1" noEditPoints="1" noAdjustHandles="1" noChangeArrowheads="1" noChangeShapeType="1" noTextEdit="1"/>
+              </p:cNvSpPr>
+              <p:nvPr/>
+            </p:nvSpPr>
+            <p:spPr>
+              <a:xfrm>
+                <a:off x="2452823" y="5668391"/>
+                <a:ext cx="6564992" cy="674352"/>
+              </a:xfrm>
+              <a:prstGeom prst="rect">
+                <a:avLst/>
+              </a:prstGeom>
+              <a:blipFill>
+                <a:blip r:embed="rId5"/>
+                <a:stretch>
+                  <a:fillRect l="-1931" b="-25926"/>
+                </a:stretch>
+              </a:blipFill>
+            </p:spPr>
+            <p:txBody>
+              <a:bodyPr/>
+              <a:lstStyle/>
+              <a:p>
+                <a:r>
+                  <a:rPr lang="en-US">
+                    <a:noFill/>
+                  </a:rPr>
+                  <a:t> </a:t>
+                </a:r>
+              </a:p>
+            </p:txBody>
+          </p:sp>
+        </mc:Fallback>
+      </mc:AlternateContent>
+    </p:spTree>
+    <p:extLst>
+      <p:ext uri="{BB962C8B-B14F-4D97-AF65-F5344CB8AC3E}">
+        <p14:creationId xmlns:p14="http://schemas.microsoft.com/office/powerpoint/2010/main" val="3424340703"/>
+      </p:ext>
+    </p:extLst>
+  </p:cSld>
+  <p:clrMapOvr>
+    <a:masterClrMapping/>
+  </p:clrMapOvr>
+  <p:timing>
+    <p:tnLst>
+      <p:par>
+        <p:cTn id="1" dur="indefinite" restart="never" nodeType="tmRoot">
+          <p:childTnLst>
+            <p:seq concurrent="1" nextAc="seek">
+              <p:cTn id="2" dur="indefinite" nodeType="mainSeq">
+                <p:childTnLst>
+                  <p:par>
+                    <p:cTn id="3" fill="hold">
+                      <p:stCondLst>
+                        <p:cond delay="indefinite"/>
+                      </p:stCondLst>
+                      <p:childTnLst>
+                        <p:par>
+                          <p:cTn id="4" fill="hold">
+                            <p:stCondLst>
+                              <p:cond delay="0"/>
+                            </p:stCondLst>
+                            <p:childTnLst>
+                              <p:par>
+                                <p:cTn id="5" presetID="9" presetClass="entr" presetSubtype="0" fill="hold" nodeType="clickEffect">
+                                  <p:stCondLst>
+                                    <p:cond delay="0"/>
+                                  </p:stCondLst>
+                                  <p:childTnLst>
+                                    <p:set>
+                                      <p:cBhvr>
+                                        <p:cTn id="6" dur="1" fill="hold">
+                                          <p:stCondLst>
+                                            <p:cond delay="0"/>
+                                          </p:stCondLst>
+                                        </p:cTn>
+                                        <p:tgtEl>
+                                          <p:spTgt spid="17"/>
+                                        </p:tgtEl>
+                                        <p:attrNameLst>
+                                          <p:attrName>style.visibility</p:attrName>
+                                        </p:attrNameLst>
+                                      </p:cBhvr>
+                                      <p:to>
+                                        <p:strVal val="visible"/>
+                                      </p:to>
+                                    </p:set>
+                                    <p:animEffect transition="in" filter="dissolve">
+                                      <p:cBhvr>
+                                        <p:cTn id="7" dur="500"/>
+                                        <p:tgtEl>
+                                          <p:spTgt spid="17"/>
+                                        </p:tgtEl>
+                                      </p:cBhvr>
+                                    </p:animEffect>
+                                  </p:childTnLst>
+                                </p:cTn>
+                              </p:par>
+                              <p:par>
+                                <p:cTn id="8" presetID="9" presetClass="entr" presetSubtype="0" fill="hold" grpId="0" nodeType="withEffect">
+                                  <p:stCondLst>
+                                    <p:cond delay="0"/>
+                                  </p:stCondLst>
+                                  <p:childTnLst>
+                                    <p:set>
+                                      <p:cBhvr>
+                                        <p:cTn id="9" dur="1" fill="hold">
+                                          <p:stCondLst>
+                                            <p:cond delay="0"/>
+                                          </p:stCondLst>
+                                        </p:cTn>
+                                        <p:tgtEl>
+                                          <p:spTgt spid="21"/>
+                                        </p:tgtEl>
+                                        <p:attrNameLst>
+                                          <p:attrName>style.visibility</p:attrName>
+                                        </p:attrNameLst>
+                                      </p:cBhvr>
+                                      <p:to>
+                                        <p:strVal val="visible"/>
+                                      </p:to>
+                                    </p:set>
+                                    <p:animEffect transition="in" filter="dissolve">
+                                      <p:cBhvr>
+                                        <p:cTn id="10" dur="500"/>
+                                        <p:tgtEl>
+                                          <p:spTgt spid="21"/>
+                                        </p:tgtEl>
+                                      </p:cBhvr>
+                                    </p:animEffect>
+                                  </p:childTnLst>
+                                </p:cTn>
+                              </p:par>
+                              <p:par>
+                                <p:cTn id="11" presetID="9" presetClass="entr" presetSubtype="0" fill="hold" grpId="0" nodeType="withEffect">
+                                  <p:stCondLst>
+                                    <p:cond delay="0"/>
+                                  </p:stCondLst>
+                                  <p:childTnLst>
+                                    <p:set>
+                                      <p:cBhvr>
+                                        <p:cTn id="12" dur="1" fill="hold">
+                                          <p:stCondLst>
+                                            <p:cond delay="0"/>
+                                          </p:stCondLst>
+                                        </p:cTn>
+                                        <p:tgtEl>
+                                          <p:spTgt spid="20"/>
+                                        </p:tgtEl>
+                                        <p:attrNameLst>
+                                          <p:attrName>style.visibility</p:attrName>
+                                        </p:attrNameLst>
+                                      </p:cBhvr>
+                                      <p:to>
+                                        <p:strVal val="visible"/>
+                                      </p:to>
+                                    </p:set>
+                                    <p:animEffect transition="in" filter="dissolve">
+                                      <p:cBhvr>
+                                        <p:cTn id="13" dur="500"/>
+                                        <p:tgtEl>
+                                          <p:spTgt spid="20"/>
+                                        </p:tgtEl>
+                                      </p:cBhvr>
+                                    </p:animEffect>
+                                  </p:childTnLst>
+                                </p:cTn>
+                              </p:par>
+                              <p:par>
+                                <p:cTn id="14" presetID="9" presetClass="entr" presetSubtype="0" fill="hold" nodeType="withEffect">
+                                  <p:stCondLst>
+                                    <p:cond delay="0"/>
+                                  </p:stCondLst>
+                                  <p:childTnLst>
+                                    <p:set>
+                                      <p:cBhvr>
+                                        <p:cTn id="15" dur="1" fill="hold">
+                                          <p:stCondLst>
+                                            <p:cond delay="0"/>
+                                          </p:stCondLst>
+                                        </p:cTn>
+                                        <p:tgtEl>
+                                          <p:spTgt spid="14"/>
+                                        </p:tgtEl>
+                                        <p:attrNameLst>
+                                          <p:attrName>style.visibility</p:attrName>
+                                        </p:attrNameLst>
+                                      </p:cBhvr>
+                                      <p:to>
+                                        <p:strVal val="visible"/>
+                                      </p:to>
+                                    </p:set>
+                                    <p:animEffect transition="in" filter="dissolve">
+                                      <p:cBhvr>
+                                        <p:cTn id="16" dur="500"/>
+                                        <p:tgtEl>
+                                          <p:spTgt spid="14"/>
+                                        </p:tgtEl>
+                                      </p:cBhvr>
+                                    </p:animEffect>
+                                  </p:childTnLst>
+                                </p:cTn>
+                              </p:par>
+                              <p:par>
+                                <p:cTn id="17" presetID="1" presetClass="entr" presetSubtype="0" fill="hold" grpId="0" nodeType="withEffect">
+                                  <p:stCondLst>
+                                    <p:cond delay="0"/>
+                                  </p:stCondLst>
+                                  <p:childTnLst>
+                                    <p:set>
+                                      <p:cBhvr>
+                                        <p:cTn id="18" dur="1" fill="hold">
+                                          <p:stCondLst>
+                                            <p:cond delay="0"/>
+                                          </p:stCondLst>
+                                        </p:cTn>
+                                        <p:tgtEl>
+                                          <p:spTgt spid="25"/>
+                                        </p:tgtEl>
+                                        <p:attrNameLst>
+                                          <p:attrName>style.visibility</p:attrName>
+                                        </p:attrNameLst>
+                                      </p:cBhvr>
+                                      <p:to>
+                                        <p:strVal val="visible"/>
+                                      </p:to>
+                                    </p:set>
+                                  </p:childTnLst>
+                                </p:cTn>
+                              </p:par>
+                            </p:childTnLst>
+                          </p:cTn>
+                        </p:par>
+                      </p:childTnLst>
+                    </p:cTn>
+                  </p:par>
+                  <p:par>
+                    <p:cTn id="19" fill="hold">
+                      <p:stCondLst>
+                        <p:cond delay="indefinite"/>
+                      </p:stCondLst>
+                      <p:childTnLst>
+                        <p:par>
+                          <p:cTn id="20" fill="hold">
+                            <p:stCondLst>
+                              <p:cond delay="0"/>
+                            </p:stCondLst>
+                            <p:childTnLst>
+                              <p:par>
+                                <p:cTn id="21" presetID="1" presetClass="entr" presetSubtype="0" fill="hold" grpId="0" nodeType="clickEffect">
+                                  <p:stCondLst>
+                                    <p:cond delay="0"/>
+                                  </p:stCondLst>
+                                  <p:childTnLst>
+                                    <p:set>
+                                      <p:cBhvr>
+                                        <p:cTn id="22" dur="1" fill="hold">
+                                          <p:stCondLst>
+                                            <p:cond delay="0"/>
+                                          </p:stCondLst>
+                                        </p:cTn>
+                                        <p:tgtEl>
+                                          <p:spTgt spid="26"/>
+                                        </p:tgtEl>
+                                        <p:attrNameLst>
+                                          <p:attrName>style.visibility</p:attrName>
+                                        </p:attrNameLst>
+                                      </p:cBhvr>
+                                      <p:to>
+                                        <p:strVal val="visible"/>
+                                      </p:to>
+                                    </p:set>
+                                  </p:childTnLst>
+                                </p:cTn>
+                              </p:par>
+                            </p:childTnLst>
+                          </p:cTn>
+                        </p:par>
+                      </p:childTnLst>
+                    </p:cTn>
+                  </p:par>
+                </p:childTnLst>
+              </p:cTn>
+              <p:prevCondLst>
+                <p:cond evt="onPrev" delay="0">
+                  <p:tgtEl>
+                    <p:sldTgt/>
+                  </p:tgtEl>
+                </p:cond>
+              </p:prevCondLst>
+              <p:nextCondLst>
+                <p:cond evt="onNext" delay="0">
+                  <p:tgtEl>
+                    <p:sldTgt/>
+                  </p:tgtEl>
+                </p:cond>
+              </p:nextCondLst>
+            </p:seq>
+          </p:childTnLst>
+        </p:cTn>
+      </p:par>
+    </p:tnLst>
+    <p:bldLst>
+      <p:bldP spid="20" grpId="0"/>
+      <p:bldP spid="21" grpId="0"/>
+      <p:bldP spid="25" grpId="0"/>
+      <p:bldP spid="26" grpId="0"/>
+    </p:bldLst>
+  </p:timing>
+</p:sld>
+</file>
+
+<file path=ppt/slides/slide13.xml><?xml version="1.0" encoding="utf-8"?>
+<p:sld xmlns:a="http://schemas.openxmlformats.org/drawingml/2006/main" xmlns:r="http://schemas.openxmlformats.org/officeDocument/2006/relationships" xmlns:p="http://schemas.openxmlformats.org/presentationml/2006/main">
+  <p:cSld>
+    <p:spTree>
+      <p:nvGrpSpPr>
+        <p:cNvPr id="1" name=""/>
+        <p:cNvGrpSpPr/>
+        <p:nvPr/>
+      </p:nvGrpSpPr>
+      <p:grpSpPr>
+        <a:xfrm>
+          <a:off x="0" y="0"/>
+          <a:ext cx="0" cy="0"/>
+          <a:chOff x="0" y="0"/>
+          <a:chExt cx="0" cy="0"/>
+        </a:xfrm>
+      </p:grpSpPr>
       <p:sp>
         <p:nvSpPr>
           <p:cNvPr id="2" name="Title 1">
@@ -6168,8 +7869,8 @@
           </a:p>
         </p:txBody>
       </p:sp>
-      <mc:AlternateContent xmlns:mc="http://schemas.openxmlformats.org/markup-compatibility/2006">
-        <mc:Choice xmlns:a14="http://schemas.microsoft.com/office/drawing/2010/main" Requires="a14">
+      <mc:AlternateContent xmlns:mc="http://schemas.openxmlformats.org/markup-compatibility/2006" xmlns:a14="http://schemas.microsoft.com/office/drawing/2010/main">
+        <mc:Choice Requires="a14">
           <p:sp>
             <p:nvSpPr>
               <p:cNvPr id="4" name="TextBox 3">
@@ -6198,6 +7899,7 @@
               </a:bodyPr>
               <a:lstStyle/>
               <a:p>
+                <a:pPr/>
                 <a14:m>
                   <m:oMathPara xmlns:m="http://schemas.openxmlformats.org/officeDocument/2006/math">
                     <m:oMathParaPr>
@@ -6315,7 +8017,7 @@
             </p:txBody>
           </p:sp>
         </mc:Choice>
-        <mc:Fallback>
+        <mc:Fallback xmlns="">
           <p:sp>
             <p:nvSpPr>
               <p:cNvPr id="4" name="TextBox 3">
@@ -6532,8 +8234,8 @@
           </a:p>
         </p:txBody>
       </p:sp>
-      <mc:AlternateContent xmlns:mc="http://schemas.openxmlformats.org/markup-compatibility/2006">
-        <mc:Choice xmlns:a14="http://schemas.microsoft.com/office/drawing/2010/main" Requires="a14">
+      <mc:AlternateContent xmlns:mc="http://schemas.openxmlformats.org/markup-compatibility/2006" xmlns:a14="http://schemas.microsoft.com/office/drawing/2010/main">
+        <mc:Choice Requires="a14">
           <p:sp>
             <p:nvSpPr>
               <p:cNvPr id="17" name="TextBox 16">
@@ -6581,13 +8283,7 @@
                           <a:rPr lang="en-US" sz="3200" b="0" i="1" smtClean="0">
                             <a:latin typeface="Cambria Math" panose="02040503050406030204" pitchFamily="18" charset="0"/>
                           </a:rPr>
-                          <m:t>_</m:t>
-                        </m:r>
-                        <m:r>
-                          <a:rPr lang="en-US" sz="3200" b="0" i="1" smtClean="0">
-                            <a:latin typeface="Cambria Math" panose="02040503050406030204" pitchFamily="18" charset="0"/>
-                          </a:rPr>
-                          <m:t>,</m:t>
+                          <m:t>_,</m:t>
                         </m:r>
                         <m:r>
                           <a:rPr lang="en-US" sz="3200" b="0" i="1" smtClean="0">
@@ -6648,7 +8344,7 @@
             </p:txBody>
           </p:sp>
         </mc:Choice>
-        <mc:Fallback>
+        <mc:Fallback xmlns="">
           <p:sp>
             <p:nvSpPr>
               <p:cNvPr id="17" name="TextBox 16">
@@ -6930,7 +8626,7 @@
                         <a:latin typeface="Cambria Math" panose="02040503050406030204" pitchFamily="18" charset="0"/>
                         <a:ea typeface="Cambria Math" panose="02040503050406030204" pitchFamily="18" charset="0"/>
                       </a:rPr>
-                      <m:t>≈</m:t>
+                      <m:t>~</m:t>
                     </m:r>
                     <m:sSub>
                       <m:sSubPr>
@@ -6941,6 +8637,12 @@
                         </m:ctrlPr>
                       </m:sSubPr>
                       <m:e>
+                        <m:r>
+                          <a:rPr lang="en-US" sz="3200" b="0" i="1" smtClean="0">
+                            <a:latin typeface="Cambria Math" panose="02040503050406030204" pitchFamily="18" charset="0"/>
+                          </a:rPr>
+                          <m:t> </m:t>
+                        </m:r>
                         <m:r>
                           <a:rPr lang="en-US" sz="3200" b="0" i="1" smtClean="0">
                             <a:latin typeface="Cambria Math" panose="02040503050406030204" pitchFamily="18" charset="0"/>
@@ -7590,8 +9292,8 @@
 </p:sld>
 </file>
 
-<file path=ppt/slides/slide13.xml><?xml version="1.0" encoding="utf-8"?>
-<p:sld xmlns:a="http://schemas.openxmlformats.org/drawingml/2006/main" xmlns:r="http://schemas.openxmlformats.org/officeDocument/2006/relationships" xmlns:p="http://schemas.openxmlformats.org/presentationml/2006/main">
+<file path=ppt/slides/slide14.xml><?xml version="1.0" encoding="utf-8"?>
+<p:sld xmlns:a="http://schemas.openxmlformats.org/drawingml/2006/main" xmlns:r="http://schemas.openxmlformats.org/officeDocument/2006/relationships" xmlns:p="http://schemas.openxmlformats.org/presentationml/2006/main" show="0">
   <p:cSld>
     <p:spTree>
       <p:nvGrpSpPr>
@@ -7700,8 +9402,8 @@
           </a:p>
         </p:txBody>
       </p:sp>
-      <mc:AlternateContent xmlns:mc="http://schemas.openxmlformats.org/markup-compatibility/2006">
-        <mc:Choice xmlns:a14="http://schemas.microsoft.com/office/drawing/2010/main" Requires="a14">
+      <mc:AlternateContent xmlns:mc="http://schemas.openxmlformats.org/markup-compatibility/2006" xmlns:a14="http://schemas.microsoft.com/office/drawing/2010/main">
+        <mc:Choice Requires="a14">
           <p:sp>
             <p:nvSpPr>
               <p:cNvPr id="4" name="TextBox 3">
@@ -7730,6 +9432,7 @@
               </a:bodyPr>
               <a:lstStyle/>
               <a:p>
+                <a:pPr/>
                 <a14:m>
                   <m:oMathPara xmlns:m="http://schemas.openxmlformats.org/officeDocument/2006/math">
                     <m:oMathParaPr>
@@ -7825,7 +9528,7 @@
             </p:txBody>
           </p:sp>
         </mc:Choice>
-        <mc:Fallback>
+        <mc:Fallback xmlns="">
           <p:sp>
             <p:nvSpPr>
               <p:cNvPr id="4" name="TextBox 3">
@@ -7979,6 +9682,145 @@
     <p:extLst>
       <p:ext uri="{BB962C8B-B14F-4D97-AF65-F5344CB8AC3E}">
         <p14:creationId xmlns:p14="http://schemas.microsoft.com/office/powerpoint/2010/main" val="2319784109"/>
+      </p:ext>
+    </p:extLst>
+  </p:cSld>
+  <p:clrMapOvr>
+    <a:masterClrMapping/>
+  </p:clrMapOvr>
+</p:sld>
+</file>
+
+<file path=ppt/slides/slide15.xml><?xml version="1.0" encoding="utf-8"?>
+<p:sld xmlns:a="http://schemas.openxmlformats.org/drawingml/2006/main" xmlns:r="http://schemas.openxmlformats.org/officeDocument/2006/relationships" xmlns:p="http://schemas.openxmlformats.org/presentationml/2006/main">
+  <p:cSld>
+    <p:spTree>
+      <p:nvGrpSpPr>
+        <p:cNvPr id="1" name=""/>
+        <p:cNvGrpSpPr/>
+        <p:nvPr/>
+      </p:nvGrpSpPr>
+      <p:grpSpPr>
+        <a:xfrm>
+          <a:off x="0" y="0"/>
+          <a:ext cx="0" cy="0"/>
+          <a:chOff x="0" y="0"/>
+          <a:chExt cx="0" cy="0"/>
+        </a:xfrm>
+      </p:grpSpPr>
+      <p:sp>
+        <p:nvSpPr>
+          <p:cNvPr id="2" name="Title 1">
+            <a:extLst>
+              <a:ext uri="{FF2B5EF4-FFF2-40B4-BE49-F238E27FC236}">
+                <a16:creationId xmlns:a16="http://schemas.microsoft.com/office/drawing/2014/main" id="{7F3E120F-234F-4BAC-D513-6F3D6523C74F}"/>
+              </a:ext>
+            </a:extLst>
+          </p:cNvPr>
+          <p:cNvSpPr>
+            <a:spLocks noGrp="1"/>
+          </p:cNvSpPr>
+          <p:nvPr>
+            <p:ph type="title"/>
+          </p:nvPr>
+        </p:nvSpPr>
+        <p:spPr/>
+        <p:txBody>
+          <a:bodyPr/>
+          <a:lstStyle/>
+          <a:p>
+            <a:r>
+              <a:rPr lang="en-US" dirty="0"/>
+              <a:t>Takeaways</a:t>
+            </a:r>
+          </a:p>
+        </p:txBody>
+      </p:sp>
+      <p:sp>
+        <p:nvSpPr>
+          <p:cNvPr id="3" name="Content Placeholder 2">
+            <a:extLst>
+              <a:ext uri="{FF2B5EF4-FFF2-40B4-BE49-F238E27FC236}">
+                <a16:creationId xmlns:a16="http://schemas.microsoft.com/office/drawing/2014/main" id="{4AD9C16F-BA1D-6EA4-D8B0-30DFE9B2962A}"/>
+              </a:ext>
+            </a:extLst>
+          </p:cNvPr>
+          <p:cNvSpPr>
+            <a:spLocks noGrp="1"/>
+          </p:cNvSpPr>
+          <p:nvPr>
+            <p:ph idx="1"/>
+          </p:nvPr>
+        </p:nvSpPr>
+        <p:spPr>
+          <a:xfrm>
+            <a:off x="838200" y="1825625"/>
+            <a:ext cx="10601960" cy="4351338"/>
+          </a:xfrm>
+        </p:spPr>
+        <p:txBody>
+          <a:bodyPr/>
+          <a:lstStyle/>
+          <a:p>
+            <a:r>
+              <a:rPr lang="en-US" dirty="0"/>
+              <a:t>Adversarial equivalence requires:</a:t>
+            </a:r>
+          </a:p>
+          <a:p>
+            <a:pPr lvl="1"/>
+            <a:r>
+              <a:rPr lang="en-US" dirty="0"/>
+              <a:t>attacker interactions </a:t>
+            </a:r>
+          </a:p>
+          <a:p>
+            <a:pPr lvl="1"/>
+            <a:r>
+              <a:rPr lang="en-US" dirty="0"/>
+              <a:t>network observations </a:t>
+            </a:r>
+          </a:p>
+          <a:p>
+            <a:pPr lvl="1"/>
+            <a:r>
+              <a:rPr lang="en-US" dirty="0"/>
+              <a:t>attacker knowledge</a:t>
+            </a:r>
+          </a:p>
+          <a:p>
+            <a:pPr marL="457200" lvl="1" indent="0">
+              <a:buNone/>
+            </a:pPr>
+            <a:endParaRPr lang="en-US" dirty="0"/>
+          </a:p>
+          <a:p>
+            <a:r>
+              <a:rPr lang="en-US" dirty="0"/>
+              <a:t>Semantics separately capture protocol and attacker computations</a:t>
+            </a:r>
+          </a:p>
+          <a:p>
+            <a:endParaRPr lang="en-US" dirty="0"/>
+          </a:p>
+          <a:p>
+            <a:r>
+              <a:rPr lang="en-US" dirty="0"/>
+              <a:t>Indistinguishability is not equality</a:t>
+            </a:r>
+          </a:p>
+          <a:p>
+            <a:endParaRPr lang="en-US" dirty="0"/>
+          </a:p>
+          <a:p>
+            <a:endParaRPr lang="en-US" dirty="0"/>
+          </a:p>
+        </p:txBody>
+      </p:sp>
+    </p:spTree>
+    <p:extLst>
+      <p:ext uri="{BB962C8B-B14F-4D97-AF65-F5344CB8AC3E}">
+        <p14:creationId xmlns:p14="http://schemas.microsoft.com/office/powerpoint/2010/main" val="3661844393"/>
       </p:ext>
     </p:extLst>
   </p:cSld>
@@ -9677,7 +11519,7 @@
           <p:nvPr/>
         </p:nvPicPr>
         <p:blipFill>
-          <a:blip r:embed="rId2">
+          <a:blip r:embed="rId3">
             <a:alphaModFix/>
           </a:blip>
           <a:stretch>
@@ -9754,8 +11596,8 @@
             <a:chExt cx="4306330" cy="809368"/>
           </a:xfrm>
         </p:grpSpPr>
-        <mc:AlternateContent xmlns:mc="http://schemas.openxmlformats.org/markup-compatibility/2006">
-          <mc:Choice xmlns:a14="http://schemas.microsoft.com/office/drawing/2010/main" Requires="a14">
+        <mc:AlternateContent xmlns:mc="http://schemas.openxmlformats.org/markup-compatibility/2006" xmlns:a14="http://schemas.microsoft.com/office/drawing/2010/main">
+          <mc:Choice Requires="a14">
             <p:sp>
               <p:nvSpPr>
                 <p:cNvPr id="6" name="TextBox 5">
@@ -9784,6 +11626,7 @@
                 </a:bodyPr>
                 <a:lstStyle/>
                 <a:p>
+                  <a:pPr/>
                   <a14:m>
                     <m:oMathPara xmlns:m="http://schemas.openxmlformats.org/officeDocument/2006/math">
                       <m:oMathParaPr>
@@ -9982,7 +11825,7 @@
               </p:txBody>
             </p:sp>
           </mc:Choice>
-          <mc:Fallback>
+          <mc:Fallback xmlns="">
             <p:sp>
               <p:nvSpPr>
                 <p:cNvPr id="6" name="TextBox 5">
@@ -10006,7 +11849,7 @@
                   <a:avLst/>
                 </a:prstGeom>
                 <a:blipFill>
-                  <a:blip r:embed="rId3"/>
+                  <a:blip r:embed="rId4"/>
                   <a:stretch>
                     <a:fillRect l="-1875" t="-7500" b="-35000"/>
                   </a:stretch>
@@ -11758,8 +13601,8 @@
           </a:p>
         </p:txBody>
       </p:sp>
-      <mc:AlternateContent xmlns:mc="http://schemas.openxmlformats.org/markup-compatibility/2006">
-        <mc:Choice xmlns:a14="http://schemas.microsoft.com/office/drawing/2010/main" Requires="a14">
+      <mc:AlternateContent xmlns:mc="http://schemas.openxmlformats.org/markup-compatibility/2006" xmlns:a14="http://schemas.microsoft.com/office/drawing/2010/main">
+        <mc:Choice Requires="a14">
           <p:sp>
             <p:nvSpPr>
               <p:cNvPr id="7" name="TextBox 6">
@@ -11838,11 +13681,12 @@
                     </m:oMath>
                   </m:oMathPara>
                 </a14:m>
+                <a:endParaRPr dirty="0"/>
               </a:p>
             </p:txBody>
           </p:sp>
         </mc:Choice>
-        <mc:Fallback>
+        <mc:Fallback xmlns="">
           <p:sp>
             <p:nvSpPr>
               <p:cNvPr id="7" name="TextBox 6">
@@ -11887,8 +13731,8 @@
           </p:sp>
         </mc:Fallback>
       </mc:AlternateContent>
-      <mc:AlternateContent xmlns:mc="http://schemas.openxmlformats.org/markup-compatibility/2006">
-        <mc:Choice xmlns:a14="http://schemas.microsoft.com/office/drawing/2010/main" Requires="a14">
+      <mc:AlternateContent xmlns:mc="http://schemas.openxmlformats.org/markup-compatibility/2006" xmlns:a14="http://schemas.microsoft.com/office/drawing/2010/main">
+        <mc:Choice Requires="a14">
           <p:sp>
             <p:nvSpPr>
               <p:cNvPr id="11" name="TextBox 10">
@@ -11997,11 +13841,12 @@
                     </m:oMath>
                   </m:oMathPara>
                 </a14:m>
+                <a:endParaRPr/>
               </a:p>
             </p:txBody>
           </p:sp>
         </mc:Choice>
-        <mc:Fallback>
+        <mc:Fallback xmlns="">
           <p:sp>
             <p:nvSpPr>
               <p:cNvPr id="11" name="TextBox 10">
@@ -12046,8 +13891,8 @@
           </p:sp>
         </mc:Fallback>
       </mc:AlternateContent>
-      <mc:AlternateContent xmlns:mc="http://schemas.openxmlformats.org/markup-compatibility/2006">
-        <mc:Choice xmlns:a14="http://schemas.microsoft.com/office/drawing/2010/main" Requires="a14">
+      <mc:AlternateContent xmlns:mc="http://schemas.openxmlformats.org/markup-compatibility/2006" xmlns:a14="http://schemas.microsoft.com/office/drawing/2010/main">
+        <mc:Choice Requires="a14">
           <p:sp>
             <p:nvSpPr>
               <p:cNvPr id="14" name="TextBox 13">
@@ -12196,11 +14041,12 @@
                     </m:oMath>
                   </m:oMathPara>
                 </a14:m>
+                <a:endParaRPr/>
               </a:p>
             </p:txBody>
           </p:sp>
         </mc:Choice>
-        <mc:Fallback>
+        <mc:Fallback xmlns="">
           <p:sp>
             <p:nvSpPr>
               <p:cNvPr id="14" name="TextBox 13">
@@ -12245,8 +14091,8 @@
           </p:sp>
         </mc:Fallback>
       </mc:AlternateContent>
-      <mc:AlternateContent xmlns:mc="http://schemas.openxmlformats.org/markup-compatibility/2006">
-        <mc:Choice xmlns:a14="http://schemas.microsoft.com/office/drawing/2010/main" Requires="a14">
+      <mc:AlternateContent xmlns:mc="http://schemas.openxmlformats.org/markup-compatibility/2006" xmlns:a14="http://schemas.microsoft.com/office/drawing/2010/main">
+        <mc:Choice Requires="a14">
           <p:sp>
             <p:nvSpPr>
               <p:cNvPr id="15" name="TextBox 14">
@@ -12425,11 +14271,12 @@
                     </m:oMath>
                   </m:oMathPara>
                 </a14:m>
+                <a:endParaRPr/>
               </a:p>
             </p:txBody>
           </p:sp>
         </mc:Choice>
-        <mc:Fallback>
+        <mc:Fallback xmlns="">
           <p:sp>
             <p:nvSpPr>
               <p:cNvPr id="15" name="TextBox 14">
@@ -12723,8 +14570,8 @@
           </a:p>
         </p:txBody>
       </p:sp>
-      <mc:AlternateContent xmlns:mc="http://schemas.openxmlformats.org/markup-compatibility/2006">
-        <mc:Choice xmlns:a14="http://schemas.microsoft.com/office/drawing/2010/main" Requires="a14">
+      <mc:AlternateContent xmlns:mc="http://schemas.openxmlformats.org/markup-compatibility/2006" xmlns:a14="http://schemas.microsoft.com/office/drawing/2010/main">
+        <mc:Choice Requires="a14">
           <p:sp>
             <p:nvSpPr>
               <p:cNvPr id="30" name="TextBox 29">
@@ -12809,11 +14656,12 @@
                     </m:oMath>
                   </m:oMathPara>
                 </a14:m>
+                <a:endParaRPr dirty="0"/>
               </a:p>
             </p:txBody>
           </p:sp>
         </mc:Choice>
-        <mc:Fallback>
+        <mc:Fallback xmlns="">
           <p:sp>
             <p:nvSpPr>
               <p:cNvPr id="30" name="TextBox 29">
@@ -12858,8 +14706,8 @@
           </p:sp>
         </mc:Fallback>
       </mc:AlternateContent>
-      <mc:AlternateContent xmlns:mc="http://schemas.openxmlformats.org/markup-compatibility/2006">
-        <mc:Choice xmlns:a14="http://schemas.microsoft.com/office/drawing/2010/main" Requires="a14">
+      <mc:AlternateContent xmlns:mc="http://schemas.openxmlformats.org/markup-compatibility/2006" xmlns:a14="http://schemas.microsoft.com/office/drawing/2010/main">
+        <mc:Choice Requires="a14">
           <p:sp>
             <p:nvSpPr>
               <p:cNvPr id="31" name="TextBox 30">
@@ -12908,11 +14756,12 @@
                     </m:oMath>
                   </m:oMathPara>
                 </a14:m>
+                <a:endParaRPr/>
               </a:p>
             </p:txBody>
           </p:sp>
         </mc:Choice>
-        <mc:Fallback>
+        <mc:Fallback xmlns="">
           <p:sp>
             <p:nvSpPr>
               <p:cNvPr id="31" name="TextBox 30">
@@ -13119,7 +14968,7 @@
         <p:spPr>
           <a:xfrm>
             <a:off x="3852092" y="1447326"/>
-            <a:ext cx="2449068" cy="369332"/>
+            <a:ext cx="2909130" cy="369332"/>
           </a:xfrm>
           <a:prstGeom prst="rect">
             <a:avLst/>
@@ -13138,7 +14987,7 @@
                   <a:schemeClr val="tx2"/>
                 </a:solidFill>
               </a:rPr>
-              <a:t>Uninterpreted function</a:t>
+              <a:t>Uninterpreted function (UF)</a:t>
             </a:r>
           </a:p>
         </p:txBody>
@@ -15793,7 +17642,7 @@
         <p:cNvPr id="1" name="">
           <a:extLst>
             <a:ext uri="{FF2B5EF4-FFF2-40B4-BE49-F238E27FC236}">
-              <a16:creationId xmlns:a16="http://schemas.microsoft.com/office/drawing/2014/main" id="{6E1C1323-9E2B-4417-64BF-852BED5DE24C}"/>
+              <a16:creationId xmlns:a16="http://schemas.microsoft.com/office/drawing/2014/main" id="{41CC9D4D-44FB-564E-F243-124928449A9C}"/>
             </a:ext>
           </a:extLst>
         </p:cNvPr>
@@ -15813,7 +17662,7 @@
           <p:cNvPr id="2" name="Title 1">
             <a:extLst>
               <a:ext uri="{FF2B5EF4-FFF2-40B4-BE49-F238E27FC236}">
-                <a16:creationId xmlns:a16="http://schemas.microsoft.com/office/drawing/2014/main" id="{45E74A4D-6019-920A-AA12-DD8C225D033B}"/>
+                <a16:creationId xmlns:a16="http://schemas.microsoft.com/office/drawing/2014/main" id="{6ACD4CAD-76A5-CC68-447D-A02CBF8B35A4}"/>
               </a:ext>
             </a:extLst>
           </p:cNvPr>
@@ -15841,7 +17690,7 @@
           <p:cNvPr id="5" name="TextBox 4">
             <a:extLst>
               <a:ext uri="{FF2B5EF4-FFF2-40B4-BE49-F238E27FC236}">
-                <a16:creationId xmlns:a16="http://schemas.microsoft.com/office/drawing/2014/main" id="{6B77B5EE-33B2-7A3D-DF94-68ED331B74EE}"/>
+                <a16:creationId xmlns:a16="http://schemas.microsoft.com/office/drawing/2014/main" id="{D11D7DC8-DA5E-717B-433F-8FBA1431C41D}"/>
               </a:ext>
             </a:extLst>
           </p:cNvPr>
@@ -15876,7 +17725,7 @@
           <p:cNvPr id="3" name="Rectangle 2">
             <a:extLst>
               <a:ext uri="{FF2B5EF4-FFF2-40B4-BE49-F238E27FC236}">
-                <a16:creationId xmlns:a16="http://schemas.microsoft.com/office/drawing/2014/main" id="{70B209BF-9BEB-9DCB-B90F-21433A52C113}"/>
+                <a16:creationId xmlns:a16="http://schemas.microsoft.com/office/drawing/2014/main" id="{C72DD43E-3C5C-C378-3102-EB783D66F92D}"/>
               </a:ext>
             </a:extLst>
           </p:cNvPr>
@@ -15925,7 +17774,7 @@
           <p:cNvPr id="6" name="Rectangle 5">
             <a:extLst>
               <a:ext uri="{FF2B5EF4-FFF2-40B4-BE49-F238E27FC236}">
-                <a16:creationId xmlns:a16="http://schemas.microsoft.com/office/drawing/2014/main" id="{9CAA8F0E-AA3D-72A7-CEBB-759645219EA4}"/>
+                <a16:creationId xmlns:a16="http://schemas.microsoft.com/office/drawing/2014/main" id="{C5B1598A-076A-E7E3-6C25-6B50D20B8D0F}"/>
               </a:ext>
             </a:extLst>
           </p:cNvPr>
@@ -15974,7 +17823,7 @@
           <p:cNvPr id="8" name="Rectangle 7">
             <a:extLst>
               <a:ext uri="{FF2B5EF4-FFF2-40B4-BE49-F238E27FC236}">
-                <a16:creationId xmlns:a16="http://schemas.microsoft.com/office/drawing/2014/main" id="{24438D57-F950-63E7-ED73-E6A4D9354B8A}"/>
+                <a16:creationId xmlns:a16="http://schemas.microsoft.com/office/drawing/2014/main" id="{43C38ABE-0B93-B13A-5D8C-E33FA6620590}"/>
               </a:ext>
             </a:extLst>
           </p:cNvPr>
@@ -16023,7 +17872,7 @@
           <p:cNvPr id="18" name="Graphic 17" descr="Devil face outline with solid fill">
             <a:extLst>
               <a:ext uri="{FF2B5EF4-FFF2-40B4-BE49-F238E27FC236}">
-                <a16:creationId xmlns:a16="http://schemas.microsoft.com/office/drawing/2014/main" id="{FB2AF799-3F97-7AEA-680D-E24026A9E80B}"/>
+                <a16:creationId xmlns:a16="http://schemas.microsoft.com/office/drawing/2014/main" id="{37A7B4D3-5AAE-44D8-435D-F29940C29723}"/>
               </a:ext>
             </a:extLst>
           </p:cNvPr>
@@ -16059,7 +17908,7 @@
           <p:cNvPr id="19" name="Straight Arrow Connector 18">
             <a:extLst>
               <a:ext uri="{FF2B5EF4-FFF2-40B4-BE49-F238E27FC236}">
-                <a16:creationId xmlns:a16="http://schemas.microsoft.com/office/drawing/2014/main" id="{757A946C-DBAC-B628-D185-86105CE4BEAF}"/>
+                <a16:creationId xmlns:a16="http://schemas.microsoft.com/office/drawing/2014/main" id="{2706125B-E9FD-092C-2075-EDD0A44FB8BA}"/>
               </a:ext>
             </a:extLst>
           </p:cNvPr>
@@ -16103,7 +17952,7 @@
           <p:cNvPr id="25" name="Straight Arrow Connector 24">
             <a:extLst>
               <a:ext uri="{FF2B5EF4-FFF2-40B4-BE49-F238E27FC236}">
-                <a16:creationId xmlns:a16="http://schemas.microsoft.com/office/drawing/2014/main" id="{4C460C7D-A3F8-D3F3-3E19-0BF6D4A2D4BA}"/>
+                <a16:creationId xmlns:a16="http://schemas.microsoft.com/office/drawing/2014/main" id="{30BF329F-A364-E788-C0C9-E244349B2D73}"/>
               </a:ext>
             </a:extLst>
           </p:cNvPr>
@@ -16147,7 +17996,7 @@
           <p:cNvPr id="35" name="Rounded Rectangle 34">
             <a:extLst>
               <a:ext uri="{FF2B5EF4-FFF2-40B4-BE49-F238E27FC236}">
-                <a16:creationId xmlns:a16="http://schemas.microsoft.com/office/drawing/2014/main" id="{1B384393-5AA7-EF31-C878-B66EB8CC3951}"/>
+                <a16:creationId xmlns:a16="http://schemas.microsoft.com/office/drawing/2014/main" id="{1AB949C2-0BD5-64A1-6BF1-67A2F93760F2}"/>
               </a:ext>
             </a:extLst>
           </p:cNvPr>
@@ -16196,7 +18045,7 @@
           <p:cNvPr id="37" name="Cloud Callout 36">
             <a:extLst>
               <a:ext uri="{FF2B5EF4-FFF2-40B4-BE49-F238E27FC236}">
-                <a16:creationId xmlns:a16="http://schemas.microsoft.com/office/drawing/2014/main" id="{8E9A3FC7-A98C-35A8-34E7-419FE390C271}"/>
+                <a16:creationId xmlns:a16="http://schemas.microsoft.com/office/drawing/2014/main" id="{68FB2876-E548-9BD1-A649-F0EF250DA9DF}"/>
               </a:ext>
             </a:extLst>
           </p:cNvPr>
@@ -16253,7 +18102,7 @@
           <p:cNvPr id="38" name="TextBox 37">
             <a:extLst>
               <a:ext uri="{FF2B5EF4-FFF2-40B4-BE49-F238E27FC236}">
-                <a16:creationId xmlns:a16="http://schemas.microsoft.com/office/drawing/2014/main" id="{6285DF5E-E61B-C598-21A4-968CE6DBE315}"/>
+                <a16:creationId xmlns:a16="http://schemas.microsoft.com/office/drawing/2014/main" id="{B69FF8D5-8B86-A15A-3019-BAB5FCCDB0AC}"/>
               </a:ext>
             </a:extLst>
           </p:cNvPr>
@@ -16292,7 +18141,7 @@
           <p:cNvPr id="39" name="TextBox 38">
             <a:extLst>
               <a:ext uri="{FF2B5EF4-FFF2-40B4-BE49-F238E27FC236}">
-                <a16:creationId xmlns:a16="http://schemas.microsoft.com/office/drawing/2014/main" id="{7D20546B-5ED8-21F8-19A8-491D5E992722}"/>
+                <a16:creationId xmlns:a16="http://schemas.microsoft.com/office/drawing/2014/main" id="{6DEA12D1-DEA7-E1E3-35B3-238F65879788}"/>
               </a:ext>
             </a:extLst>
           </p:cNvPr>
@@ -16331,7 +18180,7 @@
           <p:cNvPr id="40" name="TextBox 39">
             <a:extLst>
               <a:ext uri="{FF2B5EF4-FFF2-40B4-BE49-F238E27FC236}">
-                <a16:creationId xmlns:a16="http://schemas.microsoft.com/office/drawing/2014/main" id="{6751B223-DA84-024F-A215-6232DD124ED0}"/>
+                <a16:creationId xmlns:a16="http://schemas.microsoft.com/office/drawing/2014/main" id="{7B266D95-5AC7-04BF-F782-8E377EAF4220}"/>
               </a:ext>
             </a:extLst>
           </p:cNvPr>
@@ -16370,7 +18219,7 @@
           <p:cNvPr id="41" name="TextBox 40">
             <a:extLst>
               <a:ext uri="{FF2B5EF4-FFF2-40B4-BE49-F238E27FC236}">
-                <a16:creationId xmlns:a16="http://schemas.microsoft.com/office/drawing/2014/main" id="{C565AF29-6C97-0FB1-7305-3FC56F117EB2}"/>
+                <a16:creationId xmlns:a16="http://schemas.microsoft.com/office/drawing/2014/main" id="{CDD1BA60-CC62-F5C7-712A-0ADAE332EE12}"/>
               </a:ext>
             </a:extLst>
           </p:cNvPr>
@@ -16405,7 +18254,7 @@
           <p:cNvPr id="42" name="TextBox 41">
             <a:extLst>
               <a:ext uri="{FF2B5EF4-FFF2-40B4-BE49-F238E27FC236}">
-                <a16:creationId xmlns:a16="http://schemas.microsoft.com/office/drawing/2014/main" id="{9676E3E4-6F54-3237-4ED5-F9C450165CA3}"/>
+                <a16:creationId xmlns:a16="http://schemas.microsoft.com/office/drawing/2014/main" id="{F2AD4864-0A9B-BF96-FA60-A2C0BE6BFF04}"/>
               </a:ext>
             </a:extLst>
           </p:cNvPr>
@@ -16444,7 +18293,7 @@
           <p:cNvPr id="43" name="Rounded Rectangle 42">
             <a:extLst>
               <a:ext uri="{FF2B5EF4-FFF2-40B4-BE49-F238E27FC236}">
-                <a16:creationId xmlns:a16="http://schemas.microsoft.com/office/drawing/2014/main" id="{36C7BFB9-0478-373F-15D2-1DFAC977C8F9}"/>
+                <a16:creationId xmlns:a16="http://schemas.microsoft.com/office/drawing/2014/main" id="{9581F1FC-0355-5E17-9071-89E65801F0B9}"/>
               </a:ext>
             </a:extLst>
           </p:cNvPr>
@@ -16493,7 +18342,7 @@
           <p:cNvPr id="52" name="TextBox 51">
             <a:extLst>
               <a:ext uri="{FF2B5EF4-FFF2-40B4-BE49-F238E27FC236}">
-                <a16:creationId xmlns:a16="http://schemas.microsoft.com/office/drawing/2014/main" id="{7A3A3C09-CEB1-4B85-17C4-DE6DA6CBA669}"/>
+                <a16:creationId xmlns:a16="http://schemas.microsoft.com/office/drawing/2014/main" id="{0E3468D6-A7A4-64FE-C8AC-FE26BB153184}"/>
               </a:ext>
             </a:extLst>
           </p:cNvPr>
@@ -16517,7 +18366,11 @@
           <a:lstStyle/>
           <a:p>
             <a:r>
-              <a:rPr lang="en-US" dirty="0"/>
+              <a:rPr lang="en-US" dirty="0">
+                <a:solidFill>
+                  <a:schemeClr val="bg1"/>
+                </a:solidFill>
+              </a:rPr>
               <a:t>“sucks”</a:t>
             </a:r>
           </a:p>
@@ -16528,7 +18381,7 @@
           <p:cNvPr id="55" name="TextBox 54">
             <a:extLst>
               <a:ext uri="{FF2B5EF4-FFF2-40B4-BE49-F238E27FC236}">
-                <a16:creationId xmlns:a16="http://schemas.microsoft.com/office/drawing/2014/main" id="{0E400BAE-A495-65E2-D38F-B12387A74F46}"/>
+                <a16:creationId xmlns:a16="http://schemas.microsoft.com/office/drawing/2014/main" id="{7BDA9A6F-2906-4F0A-F5F4-3F7E93702542}"/>
               </a:ext>
             </a:extLst>
           </p:cNvPr>
@@ -16552,7 +18405,11 @@
           <a:lstStyle/>
           <a:p>
             <a:r>
-              <a:rPr lang="en-US" dirty="0"/>
+              <a:rPr lang="en-US" dirty="0">
+                <a:solidFill>
+                  <a:schemeClr val="bg1"/>
+                </a:solidFill>
+              </a:rPr>
               <a:t>“Hi Bob!”</a:t>
             </a:r>
           </a:p>
@@ -16563,7 +18420,7 @@
           <p:cNvPr id="57" name="TextBox 56">
             <a:extLst>
               <a:ext uri="{FF2B5EF4-FFF2-40B4-BE49-F238E27FC236}">
-                <a16:creationId xmlns:a16="http://schemas.microsoft.com/office/drawing/2014/main" id="{85446C71-A4A8-DFE6-FB9D-CC166EAC5B99}"/>
+                <a16:creationId xmlns:a16="http://schemas.microsoft.com/office/drawing/2014/main" id="{21BA4503-BDBB-8320-B54C-F19F914297B2}"/>
               </a:ext>
             </a:extLst>
           </p:cNvPr>
@@ -16623,10 +18480,84 @@
           </a:p>
         </p:txBody>
       </p:sp>
+      <p:sp>
+        <p:nvSpPr>
+          <p:cNvPr id="4" name="TextBox 3">
+            <a:extLst>
+              <a:ext uri="{FF2B5EF4-FFF2-40B4-BE49-F238E27FC236}">
+                <a16:creationId xmlns:a16="http://schemas.microsoft.com/office/drawing/2014/main" id="{83663471-D2D7-4141-7AAA-65F4EBA9B61E}"/>
+              </a:ext>
+            </a:extLst>
+          </p:cNvPr>
+          <p:cNvSpPr txBox="1"/>
+          <p:nvPr/>
+        </p:nvSpPr>
+        <p:spPr>
+          <a:xfrm>
+            <a:off x="6977372" y="1978459"/>
+            <a:ext cx="1415580" cy="369332"/>
+          </a:xfrm>
+          <a:prstGeom prst="rect">
+            <a:avLst/>
+          </a:prstGeom>
+          <a:noFill/>
+        </p:spPr>
+        <p:txBody>
+          <a:bodyPr wrap="none" rtlCol="0">
+            <a:spAutoFit/>
+          </a:bodyPr>
+          <a:lstStyle/>
+          <a:p>
+            <a:r>
+              <a:rPr lang="en-US" dirty="0">
+                <a:solidFill>
+                  <a:schemeClr val="bg1"/>
+                </a:solidFill>
+              </a:rPr>
+              <a:t>“Bob sucks”</a:t>
+            </a:r>
+          </a:p>
+        </p:txBody>
+      </p:sp>
+      <p:sp>
+        <p:nvSpPr>
+          <p:cNvPr id="7" name="TextBox 6">
+            <a:extLst>
+              <a:ext uri="{FF2B5EF4-FFF2-40B4-BE49-F238E27FC236}">
+                <a16:creationId xmlns:a16="http://schemas.microsoft.com/office/drawing/2014/main" id="{68A2F148-60A9-DA66-1D35-D2979205D331}"/>
+              </a:ext>
+            </a:extLst>
+          </p:cNvPr>
+          <p:cNvSpPr txBox="1"/>
+          <p:nvPr/>
+        </p:nvSpPr>
+        <p:spPr>
+          <a:xfrm>
+            <a:off x="6977372" y="1978459"/>
+            <a:ext cx="1415580" cy="369332"/>
+          </a:xfrm>
+          <a:prstGeom prst="rect">
+            <a:avLst/>
+          </a:prstGeom>
+          <a:noFill/>
+        </p:spPr>
+        <p:txBody>
+          <a:bodyPr wrap="none" rtlCol="0">
+            <a:spAutoFit/>
+          </a:bodyPr>
+          <a:lstStyle/>
+          <a:p>
+            <a:r>
+              <a:rPr lang="en-US" dirty="0"/>
+              <a:t>“Bob sucks”</a:t>
+            </a:r>
+          </a:p>
+        </p:txBody>
+      </p:sp>
     </p:spTree>
     <p:extLst>
       <p:ext uri="{BB962C8B-B14F-4D97-AF65-F5344CB8AC3E}">
-        <p14:creationId xmlns:p14="http://schemas.microsoft.com/office/powerpoint/2010/main" val="875633411"/>
+        <p14:creationId xmlns:p14="http://schemas.microsoft.com/office/powerpoint/2010/main" val="4108592029"/>
       </p:ext>
     </p:extLst>
   </p:cSld>
@@ -17009,7 +18940,7 @@
                                     <p:cond delay="0"/>
                                   </p:stCondLst>
                                   <p:childTnLst>
-                                    <p:animMotion origin="layout" path="M -1.25E-6 4.81481E-6 L -0.17578 0.25949 " pathEditMode="relative" rAng="0" ptsTypes="AA">
+                                    <p:animMotion origin="layout" path="M -1.25E-6 4.81481E-6 L -0.07526 0.06736 " pathEditMode="relative" rAng="0" ptsTypes="AA">
                                       <p:cBhvr>
                                         <p:cTn id="35" dur="2000" fill="hold"/>
                                         <p:tgtEl>
@@ -17020,7 +18951,7 @@
                                           <p:attrName>ppt_y</p:attrName>
                                         </p:attrNameLst>
                                       </p:cBhvr>
-                                      <p:rCtr x="-8789" y="12963"/>
+                                      <p:rCtr x="-3763" y="3356"/>
                                     </p:animMotion>
                                   </p:childTnLst>
                                 </p:cTn>
@@ -17031,7 +18962,7 @@
                                     <p:cond delay="0"/>
                                   </p:stCondLst>
                                   <p:childTnLst>
-                                    <p:animMotion origin="layout" path="M -2.29167E-6 -4.44444E-6 L -0.03372 0.23241 " pathEditMode="relative" rAng="0" ptsTypes="AA">
+                                    <p:animMotion origin="layout" path="M -2.29167E-6 -4.44444E-6 L 0.09063 0.05394 " pathEditMode="relative" rAng="0" ptsTypes="AA">
                                       <p:cBhvr>
                                         <p:cTn id="37" dur="2000" fill="hold"/>
                                         <p:tgtEl>
@@ -17042,7 +18973,7 @@
                                           <p:attrName>ppt_y</p:attrName>
                                         </p:attrNameLst>
                                       </p:cBhvr>
-                                      <p:rCtr x="-430" y="11829"/>
+                                      <p:rCtr x="4531" y="2685"/>
                                     </p:animMotion>
                                   </p:childTnLst>
                                 </p:cTn>
@@ -17111,7 +19042,7 @@
                                 </p:cTn>
                               </p:par>
                               <p:par>
-                                <p:cTn id="43" presetID="1" presetClass="entr" presetSubtype="0" fill="hold" nodeType="withEffect">
+                                <p:cTn id="43" presetID="9" presetClass="entr" presetSubtype="0" fill="hold" grpId="0" nodeType="withEffect">
                                   <p:stCondLst>
                                     <p:cond delay="0"/>
                                   </p:stCondLst>
@@ -17124,34 +19055,7 @@
                                           </p:stCondLst>
                                         </p:cTn>
                                         <p:tgtEl>
-                                          <p:spTgt spid="25"/>
-                                        </p:tgtEl>
-                                        <p:attrNameLst>
-                                          <p:attrName>style.visibility</p:attrName>
-                                        </p:attrNameLst>
-                                      </p:cBhvr>
-                                      <p:to>
-                                        <p:strVal val="visible"/>
-                                      </p:to>
-                                    </p:set>
-                                  </p:childTnLst>
-                                </p:cTn>
-                              </p:par>
-                              <p:par>
-                                <p:cTn id="45" presetID="9" presetClass="entr" presetSubtype="0" fill="hold" grpId="0" nodeType="withEffect">
-                                  <p:stCondLst>
-                                    <p:cond delay="0"/>
-                                  </p:stCondLst>
-                                  <p:childTnLst>
-                                    <p:set>
-                                      <p:cBhvr>
-                                        <p:cTn id="46" dur="1" fill="hold">
-                                          <p:stCondLst>
-                                            <p:cond delay="0"/>
-                                          </p:stCondLst>
-                                        </p:cTn>
-                                        <p:tgtEl>
-                                          <p:spTgt spid="43"/>
+                                          <p:spTgt spid="4"/>
                                         </p:tgtEl>
                                         <p:attrNameLst>
                                           <p:attrName>style.visibility</p:attrName>
@@ -17163,9 +19067,9 @@
                                     </p:set>
                                     <p:animEffect transition="in" filter="dissolve">
                                       <p:cBhvr>
-                                        <p:cTn id="47" dur="500"/>
+                                        <p:cTn id="45" dur="500"/>
                                         <p:tgtEl>
-                                          <p:spTgt spid="43"/>
+                                          <p:spTgt spid="4"/>
                                         </p:tgtEl>
                                       </p:cBhvr>
                                     </p:animEffect>
@@ -17179,26 +19083,26 @@
                     </p:cTn>
                   </p:par>
                   <p:par>
-                    <p:cTn id="48" fill="hold">
+                    <p:cTn id="46" fill="hold">
                       <p:stCondLst>
                         <p:cond delay="indefinite"/>
                       </p:stCondLst>
                       <p:childTnLst>
                         <p:par>
-                          <p:cTn id="49" fill="hold">
+                          <p:cTn id="47" fill="hold">
                             <p:stCondLst>
                               <p:cond delay="0"/>
                             </p:stCondLst>
                             <p:childTnLst>
                               <p:par>
-                                <p:cTn id="50" presetID="1" presetClass="entr" presetSubtype="0" fill="hold" nodeType="clickEffect">
+                                <p:cTn id="48" presetID="1" presetClass="entr" presetSubtype="0" fill="hold" nodeType="clickEffect">
                                   <p:stCondLst>
                                     <p:cond delay="0"/>
                                   </p:stCondLst>
                                   <p:childTnLst>
                                     <p:set>
                                       <p:cBhvr>
-                                        <p:cTn id="51" dur="1" fill="hold">
+                                        <p:cTn id="49" dur="1" fill="hold">
                                           <p:stCondLst>
                                             <p:cond delay="0"/>
                                           </p:stCondLst>
@@ -17222,14 +19126,153 @@
                                 </p:cTn>
                               </p:par>
                               <p:par>
-                                <p:cTn id="52" presetID="0" presetClass="path" presetSubtype="0" accel="50000" decel="50000" fill="hold" grpId="1" nodeType="withEffect">
+                                <p:cTn id="50" presetID="1" presetClass="entr" presetSubtype="0" fill="hold" nodeType="withEffect">
+                                  <p:stCondLst>
+                                    <p:cond delay="0"/>
+                                  </p:stCondLst>
+                                  <p:childTnLst>
+                                    <p:set>
+                                      <p:cBhvr>
+                                        <p:cTn id="51" dur="1" fill="hold">
+                                          <p:stCondLst>
+                                            <p:cond delay="0"/>
+                                          </p:stCondLst>
+                                        </p:cTn>
+                                        <p:tgtEl>
+                                          <p:spTgt spid="25"/>
+                                        </p:tgtEl>
+                                        <p:attrNameLst>
+                                          <p:attrName>style.visibility</p:attrName>
+                                        </p:attrNameLst>
+                                      </p:cBhvr>
+                                      <p:to>
+                                        <p:strVal val="visible"/>
+                                      </p:to>
+                                    </p:set>
+                                  </p:childTnLst>
+                                </p:cTn>
+                              </p:par>
+                              <p:par>
+                                <p:cTn id="52" presetID="1" presetClass="entr" presetSubtype="0" fill="hold" grpId="2" nodeType="withEffect">
+                                  <p:stCondLst>
+                                    <p:cond delay="0"/>
+                                  </p:stCondLst>
+                                  <p:childTnLst>
+                                    <p:set>
+                                      <p:cBhvr>
+                                        <p:cTn id="53" dur="1" fill="hold">
+                                          <p:stCondLst>
+                                            <p:cond delay="0"/>
+                                          </p:stCondLst>
+                                        </p:cTn>
+                                        <p:tgtEl>
+                                          <p:spTgt spid="7"/>
+                                        </p:tgtEl>
+                                        <p:attrNameLst>
+                                          <p:attrName>style.visibility</p:attrName>
+                                        </p:attrNameLst>
+                                      </p:cBhvr>
+                                      <p:to>
+                                        <p:strVal val="visible"/>
+                                      </p:to>
+                                    </p:set>
+                                  </p:childTnLst>
+                                </p:cTn>
+                              </p:par>
+                              <p:par>
+                                <p:cTn id="54" presetID="0" presetClass="path" presetSubtype="0" accel="50000" decel="50000" fill="hold" grpId="1" nodeType="withEffect">
+                                  <p:stCondLst>
+                                    <p:cond delay="0"/>
+                                  </p:stCondLst>
+                                  <p:childTnLst>
+                                    <p:animMotion origin="layout" path="M 1.45833E-6 2.22222E-6 L -0.09388 0.18032 " pathEditMode="relative" rAng="0" ptsTypes="AA">
+                                      <p:cBhvr>
+                                        <p:cTn id="55" dur="2000" fill="hold"/>
+                                        <p:tgtEl>
+                                          <p:spTgt spid="7"/>
+                                        </p:tgtEl>
+                                        <p:attrNameLst>
+                                          <p:attrName>ppt_x</p:attrName>
+                                          <p:attrName>ppt_y</p:attrName>
+                                        </p:attrNameLst>
+                                      </p:cBhvr>
+                                      <p:rCtr x="-4701" y="9005"/>
+                                    </p:animMotion>
+                                  </p:childTnLst>
+                                </p:cTn>
+                              </p:par>
+                            </p:childTnLst>
+                          </p:cTn>
+                        </p:par>
+                        <p:par>
+                          <p:cTn id="56" fill="hold">
+                            <p:stCondLst>
+                              <p:cond delay="2000"/>
+                            </p:stCondLst>
+                            <p:childTnLst>
+                              <p:par>
+                                <p:cTn id="57" presetID="1" presetClass="entr" presetSubtype="0" fill="hold" grpId="0" nodeType="afterEffect">
+                                  <p:stCondLst>
+                                    <p:cond delay="0"/>
+                                  </p:stCondLst>
+                                  <p:childTnLst>
+                                    <p:set>
+                                      <p:cBhvr>
+                                        <p:cTn id="58" dur="1" fill="hold">
+                                          <p:stCondLst>
+                                            <p:cond delay="0"/>
+                                          </p:stCondLst>
+                                        </p:cTn>
+                                        <p:tgtEl>
+                                          <p:spTgt spid="43"/>
+                                        </p:tgtEl>
+                                        <p:attrNameLst>
+                                          <p:attrName>style.visibility</p:attrName>
+                                        </p:attrNameLst>
+                                      </p:cBhvr>
+                                      <p:to>
+                                        <p:strVal val="visible"/>
+                                      </p:to>
+                                    </p:set>
+                                  </p:childTnLst>
+                                </p:cTn>
+                              </p:par>
+                              <p:par>
+                                <p:cTn id="59" presetID="1" presetClass="exit" presetSubtype="0" fill="hold" grpId="3" nodeType="withEffect">
+                                  <p:stCondLst>
+                                    <p:cond delay="0"/>
+                                  </p:stCondLst>
+                                  <p:childTnLst>
+                                    <p:set>
+                                      <p:cBhvr>
+                                        <p:cTn id="60" dur="1" fill="hold">
+                                          <p:stCondLst>
+                                            <p:cond delay="0"/>
+                                          </p:stCondLst>
+                                        </p:cTn>
+                                        <p:tgtEl>
+                                          <p:spTgt spid="7"/>
+                                        </p:tgtEl>
+                                        <p:attrNameLst>
+                                          <p:attrName>style.visibility</p:attrName>
+                                        </p:attrNameLst>
+                                      </p:cBhvr>
+                                      <p:to>
+                                        <p:strVal val="hidden"/>
+                                      </p:to>
+                                    </p:set>
+                                  </p:childTnLst>
+                                </p:cTn>
+                              </p:par>
+                              <p:par>
+                                <p:cTn id="61" presetID="0" presetClass="path" presetSubtype="0" accel="50000" decel="50000" fill="hold" grpId="1" nodeType="withEffect">
                                   <p:stCondLst>
                                     <p:cond delay="0"/>
                                   </p:stCondLst>
                                   <p:childTnLst>
                                     <p:animMotion origin="layout" path="M 0 0 L 0.10976 -0.02083 " pathEditMode="relative" ptsTypes="AA">
                                       <p:cBhvr>
-                                        <p:cTn id="53" dur="2000" fill="hold"/>
+                                        <p:cTn id="62" dur="2000" fill="hold"/>
                                         <p:tgtEl>
                                           <p:spTgt spid="43"/>
                                         </p:tgtEl>
@@ -17249,26 +19292,26 @@
                     </p:cTn>
                   </p:par>
                   <p:par>
-                    <p:cTn id="54" fill="hold">
+                    <p:cTn id="63" fill="hold">
                       <p:stCondLst>
                         <p:cond delay="indefinite"/>
                       </p:stCondLst>
                       <p:childTnLst>
                         <p:par>
-                          <p:cTn id="55" fill="hold">
+                          <p:cTn id="64" fill="hold">
                             <p:stCondLst>
                               <p:cond delay="0"/>
                             </p:stCondLst>
                             <p:childTnLst>
                               <p:par>
-                                <p:cTn id="56" presetID="1" presetClass="entr" presetSubtype="0" fill="hold" grpId="0" nodeType="clickEffect">
+                                <p:cTn id="65" presetID="1" presetClass="entr" presetSubtype="0" fill="hold" grpId="0" nodeType="clickEffect">
                                   <p:stCondLst>
                                     <p:cond delay="0"/>
                                   </p:stCondLst>
                                   <p:childTnLst>
                                     <p:set>
                                       <p:cBhvr>
-                                        <p:cTn id="57" dur="1" fill="hold">
+                                        <p:cTn id="66" dur="1" fill="hold">
                                           <p:stCondLst>
                                             <p:cond delay="0"/>
                                           </p:stCondLst>
@@ -17328,6 +19371,10 @@
       <p:bldP spid="55" grpId="0"/>
       <p:bldP spid="55" grpId="1"/>
       <p:bldP spid="55" grpId="2"/>
+      <p:bldP spid="4" grpId="0"/>
+      <p:bldP spid="7" grpId="1"/>
+      <p:bldP spid="7" grpId="2"/>
+      <p:bldP spid="7" grpId="3"/>
     </p:bldLst>
   </p:timing>
 </p:sld>
@@ -17383,8 +19430,8 @@
           </a:p>
         </p:txBody>
       </p:sp>
-      <mc:AlternateContent xmlns:mc="http://schemas.openxmlformats.org/markup-compatibility/2006">
-        <mc:Choice xmlns:a14="http://schemas.microsoft.com/office/drawing/2010/main" Requires="a14">
+      <mc:AlternateContent xmlns:mc="http://schemas.openxmlformats.org/markup-compatibility/2006" xmlns:a14="http://schemas.microsoft.com/office/drawing/2010/main">
+        <mc:Choice Requires="a14">
           <p:sp>
             <p:nvSpPr>
               <p:cNvPr id="4" name="TextBox 3">
@@ -17547,7 +19594,7 @@
             </p:txBody>
           </p:sp>
         </mc:Choice>
-        <mc:Fallback>
+        <mc:Fallback xmlns="">
           <p:sp>
             <p:nvSpPr>
               <p:cNvPr id="4" name="TextBox 3">
@@ -17592,8 +19639,8 @@
           </p:sp>
         </mc:Fallback>
       </mc:AlternateContent>
-      <mc:AlternateContent xmlns:mc="http://schemas.openxmlformats.org/markup-compatibility/2006">
-        <mc:Choice xmlns:a14="http://schemas.microsoft.com/office/drawing/2010/main" Requires="a14">
+      <mc:AlternateContent xmlns:mc="http://schemas.openxmlformats.org/markup-compatibility/2006" xmlns:a14="http://schemas.microsoft.com/office/drawing/2010/main">
+        <mc:Choice Requires="a14">
           <p:sp>
             <p:nvSpPr>
               <p:cNvPr id="7" name="TextBox 6">
@@ -17622,6 +19669,7 @@
               </a:bodyPr>
               <a:lstStyle/>
               <a:p>
+                <a:pPr/>
                 <a14:m>
                   <m:oMathPara xmlns:m="http://schemas.openxmlformats.org/officeDocument/2006/math">
                     <m:oMathParaPr>
@@ -17740,7 +19788,14 @@
                               <a:latin typeface="Cambria Math" panose="02040503050406030204" pitchFamily="18" charset="0"/>
                               <a:ea typeface="Cambria Math" panose="02040503050406030204" pitchFamily="18" charset="0"/>
                             </a:rPr>
-                            <m:t>𝑐h𝑎𝑛𝑛𝑒𝑙</m:t>
+                            <m:t>𝑐</m:t>
+                          </m:r>
+                          <m:r>
+                            <a:rPr lang="en-US" sz="2400" b="0" i="1" smtClean="0">
+                              <a:latin typeface="Cambria Math" panose="02040503050406030204" pitchFamily="18" charset="0"/>
+                              <a:ea typeface="Cambria Math" panose="02040503050406030204" pitchFamily="18" charset="0"/>
+                            </a:rPr>
+                            <m:t>h𝑎𝑛𝑛𝑒𝑙</m:t>
                           </m:r>
                         </m:e>
                       </m:groupChr>
@@ -17801,14 +19856,7 @@
                               <a:latin typeface="Cambria Math" panose="02040503050406030204" pitchFamily="18" charset="0"/>
                               <a:ea typeface="Cambria Math" panose="02040503050406030204" pitchFamily="18" charset="0"/>
                             </a:rPr>
-                            <m:t>’</m:t>
-                          </m:r>
-                          <m:r>
-                            <a:rPr lang="en-US" sz="2400" b="0" i="1" smtClean="0">
-                              <a:latin typeface="Cambria Math" panose="02040503050406030204" pitchFamily="18" charset="0"/>
-                              <a:ea typeface="Cambria Math" panose="02040503050406030204" pitchFamily="18" charset="0"/>
-                            </a:rPr>
-                            <m:t>,</m:t>
+                            <m:t>’,</m:t>
                           </m:r>
                           <m:sSub>
                             <m:sSubPr>
@@ -17858,7 +19906,7 @@
             </p:txBody>
           </p:sp>
         </mc:Choice>
-        <mc:Fallback>
+        <mc:Fallback xmlns="">
           <p:sp>
             <p:nvSpPr>
               <p:cNvPr id="7" name="TextBox 6">
@@ -17903,8 +19951,8 @@
           </p:sp>
         </mc:Fallback>
       </mc:AlternateContent>
-      <mc:AlternateContent xmlns:mc="http://schemas.openxmlformats.org/markup-compatibility/2006">
-        <mc:Choice xmlns:a14="http://schemas.microsoft.com/office/drawing/2010/main" Requires="a14">
+      <mc:AlternateContent xmlns:mc="http://schemas.openxmlformats.org/markup-compatibility/2006" xmlns:a14="http://schemas.microsoft.com/office/drawing/2010/main">
+        <mc:Choice Requires="a14">
           <p:sp>
             <p:nvSpPr>
               <p:cNvPr id="9" name="TextBox 8">
@@ -18052,7 +20100,14 @@
                               <a:latin typeface="Cambria Math" panose="02040503050406030204" pitchFamily="18" charset="0"/>
                               <a:ea typeface="Cambria Math" panose="02040503050406030204" pitchFamily="18" charset="0"/>
                             </a:rPr>
-                            <m:t>         </m:t>
+                            <m:t> </m:t>
+                          </m:r>
+                          <m:r>
+                            <a:rPr lang="en-US" sz="2400" b="0" i="1" smtClean="0">
+                              <a:latin typeface="Cambria Math" panose="02040503050406030204" pitchFamily="18" charset="0"/>
+                              <a:ea typeface="Cambria Math" panose="02040503050406030204" pitchFamily="18" charset="0"/>
+                            </a:rPr>
+                            <m:t>        </m:t>
                           </m:r>
                           <m:r>
                             <a:rPr lang="en-US" sz="2400" i="1">
@@ -18113,14 +20168,7 @@
                               <a:latin typeface="Cambria Math" panose="02040503050406030204" pitchFamily="18" charset="0"/>
                               <a:ea typeface="Cambria Math" panose="02040503050406030204" pitchFamily="18" charset="0"/>
                             </a:rPr>
-                            <m:t>’</m:t>
-                          </m:r>
-                          <m:r>
-                            <a:rPr lang="en-US" sz="2400" b="0" i="1" smtClean="0">
-                              <a:latin typeface="Cambria Math" panose="02040503050406030204" pitchFamily="18" charset="0"/>
-                              <a:ea typeface="Cambria Math" panose="02040503050406030204" pitchFamily="18" charset="0"/>
-                            </a:rPr>
-                            <m:t>,</m:t>
+                            <m:t>’,</m:t>
                           </m:r>
                           <m:sSub>
                             <m:sSubPr>
@@ -18170,7 +20218,7 @@
             </p:txBody>
           </p:sp>
         </mc:Choice>
-        <mc:Fallback>
+        <mc:Fallback xmlns="">
           <p:sp>
             <p:nvSpPr>
               <p:cNvPr id="9" name="TextBox 8">
@@ -18215,8 +20263,8 @@
           </p:sp>
         </mc:Fallback>
       </mc:AlternateContent>
-      <mc:AlternateContent xmlns:mc="http://schemas.openxmlformats.org/markup-compatibility/2006">
-        <mc:Choice xmlns:a14="http://schemas.microsoft.com/office/drawing/2010/main" Requires="a14">
+      <mc:AlternateContent xmlns:mc="http://schemas.openxmlformats.org/markup-compatibility/2006" xmlns:a14="http://schemas.microsoft.com/office/drawing/2010/main">
+        <mc:Choice Requires="a14">
           <p:sp>
             <p:nvSpPr>
               <p:cNvPr id="10" name="TextBox 9">
@@ -18245,6 +20293,7 @@
               </a:bodyPr>
               <a:lstStyle/>
               <a:p>
+                <a:pPr/>
                 <a14:m>
                   <m:oMathPara xmlns:m="http://schemas.openxmlformats.org/officeDocument/2006/math">
                     <m:oMathParaPr>
@@ -18541,7 +20590,7 @@
             </p:txBody>
           </p:sp>
         </mc:Choice>
-        <mc:Fallback>
+        <mc:Fallback xmlns="">
           <p:sp>
             <p:nvSpPr>
               <p:cNvPr id="10" name="TextBox 9">
@@ -18586,8 +20635,8 @@
           </p:sp>
         </mc:Fallback>
       </mc:AlternateContent>
-      <mc:AlternateContent xmlns:mc="http://schemas.openxmlformats.org/markup-compatibility/2006">
-        <mc:Choice xmlns:a14="http://schemas.microsoft.com/office/drawing/2010/main" Requires="a14">
+      <mc:AlternateContent xmlns:mc="http://schemas.openxmlformats.org/markup-compatibility/2006" xmlns:a14="http://schemas.microsoft.com/office/drawing/2010/main">
+        <mc:Choice Requires="a14">
           <p:sp>
             <p:nvSpPr>
               <p:cNvPr id="11" name="TextBox 10">
@@ -18616,6 +20665,7 @@
               </a:bodyPr>
               <a:lstStyle/>
               <a:p>
+                <a:pPr/>
                 <a14:m>
                   <m:oMathPara xmlns:m="http://schemas.openxmlformats.org/officeDocument/2006/math">
                     <m:oMathParaPr>
@@ -18735,7 +20785,17 @@
                               <a:latin typeface="Cambria Math" panose="02040503050406030204" pitchFamily="18" charset="0"/>
                               <a:ea typeface="Cambria Math" panose="02040503050406030204" pitchFamily="18" charset="0"/>
                             </a:rPr>
-                            <m:t>derive</m:t>
+                            <m:t>d</m:t>
+                          </m:r>
+                          <m:r>
+                            <m:rPr>
+                              <m:sty m:val="p"/>
+                            </m:rPr>
+                            <a:rPr lang="en-US" sz="2400" b="0" i="1" smtClean="0">
+                              <a:latin typeface="Cambria Math" panose="02040503050406030204" pitchFamily="18" charset="0"/>
+                              <a:ea typeface="Cambria Math" panose="02040503050406030204" pitchFamily="18" charset="0"/>
+                            </a:rPr>
+                            <m:t>erive</m:t>
                           </m:r>
                           <m:d>
                             <m:dPr>
@@ -18955,7 +21015,7 @@
             </p:txBody>
           </p:sp>
         </mc:Choice>
-        <mc:Fallback>
+        <mc:Fallback xmlns="">
           <p:sp>
             <p:nvSpPr>
               <p:cNvPr id="11" name="TextBox 10">
@@ -19238,13 +21298,14 @@
           </p:cNvPr>
           <p:cNvCxnSpPr>
             <a:cxnSpLocks/>
+            <a:stCxn id="20" idx="1"/>
           </p:cNvCxnSpPr>
           <p:nvPr/>
         </p:nvCxnSpPr>
         <p:spPr>
           <a:xfrm flipH="1">
-            <a:off x="5931578" y="3506122"/>
-            <a:ext cx="790839" cy="346524"/>
+            <a:off x="5862320" y="3536544"/>
+            <a:ext cx="97479" cy="313511"/>
           </a:xfrm>
           <a:prstGeom prst="straightConnector1">
             <a:avLst/>
@@ -19282,8 +21343,8 @@
         </p:nvSpPr>
         <p:spPr>
           <a:xfrm>
-            <a:off x="6722417" y="3332495"/>
-            <a:ext cx="4360617" cy="369332"/>
+            <a:off x="5959799" y="3351878"/>
+            <a:ext cx="5566332" cy="369332"/>
           </a:xfrm>
           <a:prstGeom prst="rect">
             <a:avLst/>
@@ -19302,7 +21363,7 @@
                   <a:schemeClr val="accent1"/>
                 </a:solidFill>
               </a:rPr>
-              <a:t>Adversary (term constructors/destructors)</a:t>
+              <a:t>Adversary capabilities (term constructors/destructors)</a:t>
             </a:r>
           </a:p>
         </p:txBody>

</xml_diff>